<commit_message>
some fix on style guide
</commit_message>
<xml_diff>
--- a/styleguide/Jibres-brand-styleguide.pptx
+++ b/styleguide/Jibres-brand-styleguide.pptx
@@ -244,7 +244,7 @@
           <a:p>
             <a:fld id="{6C0DDEB0-B030-4B93-828E-484F5FD06683}" type="datetimeFigureOut">
               <a:rPr lang="en-US" smtClean="0"/>
-              <a:t>11/17/2019</a:t>
+              <a:t>12/6/2019</a:t>
             </a:fld>
             <a:endParaRPr lang="en-US"/>
           </a:p>
@@ -2043,7 +2043,7 @@
     <p:bg>
       <p:bgPr>
         <a:solidFill>
-          <a:srgbClr val="FE0002"/>
+          <a:srgbClr val="C80A5A"/>
         </a:solidFill>
         <a:effectLst/>
       </p:bgPr>
@@ -2078,13 +2078,12 @@
               </a:ext>
             </a:extLst>
           </a:blip>
-          <a:stretch>
-            <a:fillRect/>
-          </a:stretch>
+          <a:srcRect/>
+          <a:stretch/>
         </p:blipFill>
         <p:spPr>
           <a:xfrm>
-            <a:off x="1795328" y="2367182"/>
+            <a:off x="5019585" y="2213356"/>
             <a:ext cx="2152829" cy="2152829"/>
           </a:xfrm>
           <a:prstGeom prst="rect">
@@ -2092,52 +2091,6 @@
           </a:prstGeom>
         </p:spPr>
       </p:pic>
-      <p:sp>
-        <p:nvSpPr>
-          <p:cNvPr id="4" name="TextBox 3">
-            <a:extLst>
-              <a:ext uri="{FF2B5EF4-FFF2-40B4-BE49-F238E27FC236}">
-                <a16:creationId xmlns:a16="http://schemas.microsoft.com/office/drawing/2014/main" id="{E8C4DBA6-C771-4A9D-AAFB-79C5F9DCE417}"/>
-              </a:ext>
-            </a:extLst>
-          </p:cNvPr>
-          <p:cNvSpPr txBox="1"/>
-          <p:nvPr userDrawn="1"/>
-        </p:nvSpPr>
-        <p:spPr>
-          <a:xfrm>
-            <a:off x="4624522" y="1981200"/>
-            <a:ext cx="5772150" cy="2646878"/>
-          </a:xfrm>
-          <a:prstGeom prst="rect">
-            <a:avLst/>
-          </a:prstGeom>
-          <a:noFill/>
-        </p:spPr>
-        <p:txBody>
-          <a:bodyPr wrap="square" rtlCol="0">
-            <a:spAutoFit/>
-          </a:bodyPr>
-          <a:lstStyle/>
-          <a:p>
-            <a:r>
-              <a:rPr lang="en-US" sz="16600" dirty="0" err="1">
-                <a:solidFill>
-                  <a:schemeClr val="bg1"/>
-                </a:solidFill>
-                <a:latin typeface="Acre Medium" panose="00000600000000000000" pitchFamily="50" charset="0"/>
-              </a:rPr>
-              <a:t>JIbres</a:t>
-            </a:r>
-            <a:endParaRPr lang="en-US" sz="16600" dirty="0">
-              <a:solidFill>
-                <a:schemeClr val="bg1"/>
-              </a:solidFill>
-              <a:latin typeface="Acre Medium" panose="00000600000000000000" pitchFamily="50" charset="0"/>
-            </a:endParaRPr>
-          </a:p>
-        </p:txBody>
-      </p:sp>
     </p:spTree>
     <p:extLst>
       <p:ext uri="{BB962C8B-B14F-4D97-AF65-F5344CB8AC3E}">
@@ -3995,24 +3948,40 @@
           </a:p>
         </p:txBody>
       </p:sp>
-      <p:sp>
-        <p:nvSpPr>
-          <p:cNvPr id="7" name="Picture Placeholder 6">
+      <p:pic>
+        <p:nvPicPr>
+          <p:cNvPr id="6" name="Picture Placeholder 5">
             <a:extLst>
               <a:ext uri="{FF2B5EF4-FFF2-40B4-BE49-F238E27FC236}">
-                <a16:creationId xmlns:a16="http://schemas.microsoft.com/office/drawing/2014/main" id="{706A336A-ED89-4BB8-9183-D66CDEB6DFBD}"/>
+                <a16:creationId xmlns:a16="http://schemas.microsoft.com/office/drawing/2014/main" id="{DFF52977-146D-43AF-98FB-D027333AB4A6}"/>
               </a:ext>
             </a:extLst>
           </p:cNvPr>
-          <p:cNvSpPr>
-            <a:spLocks noGrp="1"/>
-          </p:cNvSpPr>
+          <p:cNvPicPr>
+            <a:picLocks noGrp="1" noChangeAspect="1"/>
+          </p:cNvPicPr>
           <p:nvPr>
             <p:ph type="pic" idx="1"/>
           </p:nvPr>
-        </p:nvSpPr>
-        <p:spPr/>
-      </p:sp>
+        </p:nvPicPr>
+        <p:blipFill>
+          <a:blip r:embed="rId2">
+            <a:extLst>
+              <a:ext uri="{28A0092B-C50C-407E-A947-70E740481C1C}">
+                <a14:useLocalDpi xmlns:a14="http://schemas.microsoft.com/office/drawing/2010/main" val="0"/>
+              </a:ext>
+            </a:extLst>
+          </a:blip>
+          <a:srcRect/>
+          <a:stretch/>
+        </p:blipFill>
+        <p:spPr>
+          <a:xfrm>
+            <a:off x="6562725" y="2372165"/>
+            <a:ext cx="4340996" cy="1356561"/>
+          </a:xfrm>
+        </p:spPr>
+      </p:pic>
       <p:sp>
         <p:nvSpPr>
           <p:cNvPr id="3" name="Content Placeholder 2"/>
@@ -4064,36 +4033,6 @@
           </a:p>
         </p:txBody>
       </p:sp>
-      <p:pic>
-        <p:nvPicPr>
-          <p:cNvPr id="10" name="Picture 9">
-            <a:extLst>
-              <a:ext uri="{FF2B5EF4-FFF2-40B4-BE49-F238E27FC236}">
-                <a16:creationId xmlns:a16="http://schemas.microsoft.com/office/drawing/2014/main" id="{A3CCF8DA-7044-4723-B5FB-1653EE760E61}"/>
-              </a:ext>
-            </a:extLst>
-          </p:cNvPr>
-          <p:cNvPicPr>
-            <a:picLocks noChangeAspect="1"/>
-          </p:cNvPicPr>
-          <p:nvPr/>
-        </p:nvPicPr>
-        <p:blipFill>
-          <a:blip r:embed="rId2"/>
-          <a:stretch>
-            <a:fillRect/>
-          </a:stretch>
-        </p:blipFill>
-        <p:spPr>
-          <a:xfrm>
-            <a:off x="6026033" y="2431933"/>
-            <a:ext cx="4677428" cy="2314898"/>
-          </a:xfrm>
-          <a:prstGeom prst="rect">
-            <a:avLst/>
-          </a:prstGeom>
-        </p:spPr>
-      </p:pic>
     </p:spTree>
     <p:extLst>
       <p:ext uri="{BB962C8B-B14F-4D97-AF65-F5344CB8AC3E}">
@@ -4146,24 +4085,43 @@
           </a:p>
         </p:txBody>
       </p:sp>
-      <p:sp>
-        <p:nvSpPr>
-          <p:cNvPr id="6" name="Picture Placeholder 5">
+      <p:pic>
+        <p:nvPicPr>
+          <p:cNvPr id="12" name="Picture Placeholder 11">
             <a:extLst>
               <a:ext uri="{FF2B5EF4-FFF2-40B4-BE49-F238E27FC236}">
-                <a16:creationId xmlns:a16="http://schemas.microsoft.com/office/drawing/2014/main" id="{55678F02-9346-4F3E-9696-D29E1F1BCE5D}"/>
+                <a16:creationId xmlns:a16="http://schemas.microsoft.com/office/drawing/2014/main" id="{99410408-A77A-434C-BCDE-65D8667EFE24}"/>
               </a:ext>
             </a:extLst>
           </p:cNvPr>
-          <p:cNvSpPr>
-            <a:spLocks noGrp="1"/>
-          </p:cNvSpPr>
+          <p:cNvPicPr>
+            <a:picLocks noGrp="1" noChangeAspect="1"/>
+          </p:cNvPicPr>
           <p:nvPr>
             <p:ph type="pic" idx="1"/>
           </p:nvPr>
-        </p:nvSpPr>
-        <p:spPr/>
-      </p:sp>
+        </p:nvPicPr>
+        <p:blipFill>
+          <a:blip r:embed="rId2" cstate="print">
+            <a:extLst>
+              <a:ext uri="{28A0092B-C50C-407E-A947-70E740481C1C}">
+                <a14:useLocalDpi xmlns:a14="http://schemas.microsoft.com/office/drawing/2010/main" val="0"/>
+              </a:ext>
+            </a:extLst>
+          </a:blip>
+          <a:srcRect/>
+          <a:stretch/>
+        </p:blipFill>
+        <p:spPr>
+          <a:xfrm>
+            <a:off x="6096000" y="2691468"/>
+            <a:ext cx="5040313" cy="1575097"/>
+          </a:xfrm>
+          <a:prstGeom prst="rect">
+            <a:avLst/>
+          </a:prstGeom>
+        </p:spPr>
+      </p:pic>
       <p:sp>
         <p:nvSpPr>
           <p:cNvPr id="3" name="Content Placeholder 2"/>
@@ -4223,16 +4181,15 @@
           </p:cNvPicPr>
           <p:nvPr/>
         </p:nvPicPr>
-        <p:blipFill>
-          <a:blip r:embed="rId2"/>
-          <a:stretch>
-            <a:fillRect/>
-          </a:stretch>
+        <p:blipFill rotWithShape="1">
+          <a:blip r:embed="rId3"/>
+          <a:srcRect l="5030" t="11333" r="9448" b="57874"/>
+          <a:stretch/>
         </p:blipFill>
         <p:spPr>
           <a:xfrm>
-            <a:off x="5981783" y="2321400"/>
-            <a:ext cx="4544059" cy="2629267"/>
+            <a:off x="6096000" y="1343026"/>
+            <a:ext cx="5541706" cy="1154522"/>
           </a:xfrm>
           <a:prstGeom prst="rect">
             <a:avLst/>

</xml_diff>

<commit_message>
add transition effect to slides
</commit_message>
<xml_diff>
--- a/styleguide/Jibres-brand-styleguide.pptx
+++ b/styleguide/Jibres-brand-styleguide.pptx
@@ -6,7 +6,7 @@
     <p:sldMasterId id="2147483664" r:id="rId2"/>
   </p:sldMasterIdLst>
   <p:notesMasterIdLst>
-    <p:notesMasterId r:id="rId17"/>
+    <p:notesMasterId r:id="rId18"/>
   </p:notesMasterIdLst>
   <p:sldIdLst>
     <p:sldId id="256" r:id="rId3"/>
@@ -20,9 +20,10 @@
     <p:sldId id="264" r:id="rId11"/>
     <p:sldId id="265" r:id="rId12"/>
     <p:sldId id="266" r:id="rId13"/>
-    <p:sldId id="267" r:id="rId14"/>
-    <p:sldId id="268" r:id="rId15"/>
-    <p:sldId id="269" r:id="rId16"/>
+    <p:sldId id="270" r:id="rId14"/>
+    <p:sldId id="267" r:id="rId15"/>
+    <p:sldId id="268" r:id="rId16"/>
+    <p:sldId id="269" r:id="rId17"/>
   </p:sldIdLst>
   <p:sldSz cx="12192000" cy="6858000"/>
   <p:notesSz cx="6858000" cy="9144000"/>
@@ -137,6 +138,7 @@
             <p14:sldId id="264"/>
             <p14:sldId id="265"/>
             <p14:sldId id="266"/>
+            <p14:sldId id="270"/>
             <p14:sldId id="267"/>
             <p14:sldId id="268"/>
             <p14:sldId id="269"/>
@@ -736,6 +738,9 @@
   <p:clrMapOvr>
     <a:masterClrMapping/>
   </p:clrMapOvr>
+  <p:transition spd="slow">
+    <p:push dir="u"/>
+  </p:transition>
   <p:extLst>
     <p:ext uri="{DCECCB84-F9BA-43D5-87BE-67443E8EF086}">
       <p15:sldGuideLst xmlns:p15="http://schemas.microsoft.com/office/powerpoint/2012/main">
@@ -751,6 +756,162 @@
 </file>
 
 <file path=ppt/slideLayouts/slideLayout10.xml><?xml version="1.0" encoding="utf-8"?>
+<p:sldLayout xmlns:a="http://schemas.openxmlformats.org/drawingml/2006/main" xmlns:r="http://schemas.openxmlformats.org/officeDocument/2006/relationships" xmlns:p="http://schemas.openxmlformats.org/presentationml/2006/main" type="obj" preserve="1">
+  <p:cSld name="Title and Content">
+    <p:spTree>
+      <p:nvGrpSpPr>
+        <p:cNvPr id="1" name=""/>
+        <p:cNvGrpSpPr/>
+        <p:nvPr/>
+      </p:nvGrpSpPr>
+      <p:grpSpPr>
+        <a:xfrm>
+          <a:off x="0" y="0"/>
+          <a:ext cx="0" cy="0"/>
+          <a:chOff x="0" y="0"/>
+          <a:chExt cx="0" cy="0"/>
+        </a:xfrm>
+      </p:grpSpPr>
+      <p:sp>
+        <p:nvSpPr>
+          <p:cNvPr id="2" name="Title 1"/>
+          <p:cNvSpPr>
+            <a:spLocks noGrp="1"/>
+          </p:cNvSpPr>
+          <p:nvPr>
+            <p:ph type="title"/>
+          </p:nvPr>
+        </p:nvSpPr>
+        <p:spPr/>
+        <p:txBody>
+          <a:bodyPr/>
+          <a:lstStyle/>
+          <a:p>
+            <a:r>
+              <a:rPr lang="en-US"/>
+              <a:t>Click to edit Master title style</a:t>
+            </a:r>
+          </a:p>
+        </p:txBody>
+      </p:sp>
+      <p:sp>
+        <p:nvSpPr>
+          <p:cNvPr id="3" name="Content Placeholder 2"/>
+          <p:cNvSpPr>
+            <a:spLocks noGrp="1"/>
+          </p:cNvSpPr>
+          <p:nvPr>
+            <p:ph idx="1"/>
+          </p:nvPr>
+        </p:nvSpPr>
+        <p:spPr/>
+        <p:txBody>
+          <a:bodyPr/>
+          <a:lstStyle/>
+          <a:p>
+            <a:pPr lvl="0"/>
+            <a:r>
+              <a:rPr lang="en-US"/>
+              <a:t>Edit Master text styles</a:t>
+            </a:r>
+          </a:p>
+          <a:p>
+            <a:pPr lvl="1"/>
+            <a:r>
+              <a:rPr lang="en-US"/>
+              <a:t>Second level</a:t>
+            </a:r>
+          </a:p>
+          <a:p>
+            <a:pPr lvl="2"/>
+            <a:r>
+              <a:rPr lang="en-US"/>
+              <a:t>Third level</a:t>
+            </a:r>
+          </a:p>
+          <a:p>
+            <a:pPr lvl="3"/>
+            <a:r>
+              <a:rPr lang="en-US"/>
+              <a:t>Fourth level</a:t>
+            </a:r>
+          </a:p>
+          <a:p>
+            <a:pPr lvl="4"/>
+            <a:r>
+              <a:rPr lang="en-US"/>
+              <a:t>Fifth level</a:t>
+            </a:r>
+          </a:p>
+        </p:txBody>
+      </p:sp>
+      <p:sp>
+        <p:nvSpPr>
+          <p:cNvPr id="5" name="Footer Placeholder 4"/>
+          <p:cNvSpPr>
+            <a:spLocks noGrp="1"/>
+          </p:cNvSpPr>
+          <p:nvPr>
+            <p:ph type="ftr" sz="quarter" idx="11"/>
+          </p:nvPr>
+        </p:nvSpPr>
+        <p:spPr>
+          <a:xfrm>
+            <a:off x="1055687" y="5943599"/>
+            <a:ext cx="3033045" cy="365125"/>
+          </a:xfrm>
+          <a:prstGeom prst="rect">
+            <a:avLst/>
+          </a:prstGeom>
+        </p:spPr>
+        <p:txBody>
+          <a:bodyPr/>
+          <a:lstStyle/>
+          <a:p>
+            <a:endParaRPr lang="en-US"/>
+          </a:p>
+        </p:txBody>
+      </p:sp>
+      <p:sp>
+        <p:nvSpPr>
+          <p:cNvPr id="6" name="Slide Number Placeholder 5"/>
+          <p:cNvSpPr>
+            <a:spLocks noGrp="1"/>
+          </p:cNvSpPr>
+          <p:nvPr>
+            <p:ph type="sldNum" sz="quarter" idx="12"/>
+          </p:nvPr>
+        </p:nvSpPr>
+        <p:spPr/>
+        <p:txBody>
+          <a:bodyPr/>
+          <a:lstStyle/>
+          <a:p>
+            <a:fld id="{6B8230D4-A52F-48C3-88BB-7CF0A26BA1C5}" type="slidenum">
+              <a:rPr lang="en-US" smtClean="0"/>
+              <a:t>‹#›</a:t>
+            </a:fld>
+            <a:endParaRPr lang="en-US"/>
+          </a:p>
+        </p:txBody>
+      </p:sp>
+    </p:spTree>
+    <p:extLst>
+      <p:ext uri="{BB962C8B-B14F-4D97-AF65-F5344CB8AC3E}">
+        <p14:creationId xmlns:p14="http://schemas.microsoft.com/office/powerpoint/2010/main" val="751939655"/>
+      </p:ext>
+    </p:extLst>
+  </p:cSld>
+  <p:clrMapOvr>
+    <a:masterClrMapping/>
+  </p:clrMapOvr>
+  <p:transition spd="slow">
+    <p:push dir="u"/>
+  </p:transition>
+</p:sldLayout>
+</file>
+
+<file path=ppt/slideLayouts/slideLayout11.xml><?xml version="1.0" encoding="utf-8"?>
 <p:sldLayout xmlns:a="http://schemas.openxmlformats.org/drawingml/2006/main" xmlns:r="http://schemas.openxmlformats.org/officeDocument/2006/relationships" xmlns:p="http://schemas.openxmlformats.org/presentationml/2006/main" type="twoObj" preserve="1">
   <p:cSld name="Two Content">
     <p:spTree>
@@ -961,10 +1122,13 @@
   <p:clrMapOvr>
     <a:masterClrMapping/>
   </p:clrMapOvr>
+  <p:transition spd="slow">
+    <p:push dir="u"/>
+  </p:transition>
 </p:sldLayout>
 </file>
 
-<file path=ppt/slideLayouts/slideLayout11.xml><?xml version="1.0" encoding="utf-8"?>
+<file path=ppt/slideLayouts/slideLayout12.xml><?xml version="1.0" encoding="utf-8"?>
 <p:sldLayout xmlns:a="http://schemas.openxmlformats.org/drawingml/2006/main" xmlns:r="http://schemas.openxmlformats.org/officeDocument/2006/relationships" xmlns:p="http://schemas.openxmlformats.org/presentationml/2006/main" type="titleOnly" preserve="1">
   <p:cSld name="Title Only">
     <p:spTree>
@@ -1063,10 +1227,13 @@
   <p:clrMapOvr>
     <a:masterClrMapping/>
   </p:clrMapOvr>
+  <p:transition spd="slow">
+    <p:push dir="u"/>
+  </p:transition>
 </p:sldLayout>
 </file>
 
-<file path=ppt/slideLayouts/slideLayout12.xml><?xml version="1.0" encoding="utf-8"?>
+<file path=ppt/slideLayouts/slideLayout13.xml><?xml version="1.0" encoding="utf-8"?>
 <p:sldLayout xmlns:a="http://schemas.openxmlformats.org/drawingml/2006/main" xmlns:r="http://schemas.openxmlformats.org/officeDocument/2006/relationships" xmlns:p="http://schemas.openxmlformats.org/presentationml/2006/main" type="blank" preserve="1">
   <p:cSld name="1_Blank">
     <p:spTree>
@@ -1143,10 +1310,13 @@
   <p:clrMapOvr>
     <a:masterClrMapping/>
   </p:clrMapOvr>
+  <p:transition spd="slow">
+    <p:push dir="u"/>
+  </p:transition>
 </p:sldLayout>
 </file>
 
-<file path=ppt/slideLayouts/slideLayout13.xml><?xml version="1.0" encoding="utf-8"?>
+<file path=ppt/slideLayouts/slideLayout14.xml><?xml version="1.0" encoding="utf-8"?>
 <p:sldLayout xmlns:a="http://schemas.openxmlformats.org/drawingml/2006/main" xmlns:r="http://schemas.openxmlformats.org/officeDocument/2006/relationships" xmlns:p="http://schemas.openxmlformats.org/presentationml/2006/main" type="blank" preserve="1">
   <p:cSld name="Cover">
     <p:bg>
@@ -1219,7 +1389,7 @@
 </p:sldLayout>
 </file>
 
-<file path=ppt/slideLayouts/slideLayout14.xml><?xml version="1.0" encoding="utf-8"?>
+<file path=ppt/slideLayouts/slideLayout15.xml><?xml version="1.0" encoding="utf-8"?>
 <p:sldLayout xmlns:a="http://schemas.openxmlformats.org/drawingml/2006/main" xmlns:r="http://schemas.openxmlformats.org/officeDocument/2006/relationships" xmlns:p="http://schemas.openxmlformats.org/presentationml/2006/main" preserve="1" userDrawn="1">
   <p:cSld name="Intro">
     <p:spTree>
@@ -1345,7 +1515,7 @@
             <a:spLocks noGrp="1"/>
           </p:cNvSpPr>
           <p:nvPr>
-            <p:ph type="title"/>
+            <p:ph type="title" hasCustomPrompt="1"/>
           </p:nvPr>
         </p:nvSpPr>
         <p:spPr>
@@ -1366,7 +1536,7 @@
           <a:p>
             <a:r>
               <a:rPr lang="en-US" dirty="0"/>
-              <a:t>Click to edit Master title style</a:t>
+              <a:t>CLICK TO EDIT MASTER TITLE STYLE</a:t>
             </a:r>
           </a:p>
         </p:txBody>
@@ -1546,6 +1716,9 @@
   <p:clrMapOvr>
     <a:masterClrMapping/>
   </p:clrMapOvr>
+  <p:transition spd="slow">
+    <p:push dir="u"/>
+  </p:transition>
   <p:extLst>
     <p:ext uri="{DCECCB84-F9BA-43D5-87BE-67443E8EF086}">
       <p15:sldGuideLst xmlns:p15="http://schemas.microsoft.com/office/powerpoint/2012/main">
@@ -1584,7 +1757,7 @@
             <a:spLocks noGrp="1"/>
           </p:cNvSpPr>
           <p:nvPr>
-            <p:ph type="title"/>
+            <p:ph type="title" hasCustomPrompt="1"/>
           </p:nvPr>
         </p:nvSpPr>
         <p:spPr>
@@ -1605,7 +1778,7 @@
           <a:p>
             <a:r>
               <a:rPr lang="en-US" dirty="0"/>
-              <a:t>Click to edit Master title style</a:t>
+              <a:t>CLICK TO EDIT MASTER TITLE STYLE</a:t>
             </a:r>
           </a:p>
         </p:txBody>
@@ -1762,6 +1935,9 @@
   <p:clrMapOvr>
     <a:masterClrMapping/>
   </p:clrMapOvr>
+  <p:transition spd="slow">
+    <p:push dir="u"/>
+  </p:transition>
   <p:extLst>
     <p:ext uri="{DCECCB84-F9BA-43D5-87BE-67443E8EF086}">
       <p15:sldGuideLst xmlns:p15="http://schemas.microsoft.com/office/powerpoint/2012/main">
@@ -1800,7 +1976,7 @@
             <a:spLocks noGrp="1"/>
           </p:cNvSpPr>
           <p:nvPr>
-            <p:ph type="title"/>
+            <p:ph type="title" hasCustomPrompt="1"/>
           </p:nvPr>
         </p:nvSpPr>
         <p:spPr>
@@ -1821,7 +1997,7 @@
           <a:p>
             <a:r>
               <a:rPr lang="en-US" dirty="0"/>
-              <a:t>Click to edit Master title style</a:t>
+              <a:t>CLICK TO EDIT MASTER TITLE STYLE</a:t>
             </a:r>
           </a:p>
         </p:txBody>
@@ -1978,6 +2154,9 @@
   <p:clrMapOvr>
     <a:masterClrMapping/>
   </p:clrMapOvr>
+  <p:transition spd="slow">
+    <p:push dir="u"/>
+  </p:transition>
   <p:extLst>
     <p:ext uri="{DCECCB84-F9BA-43D5-87BE-67443E8EF086}">
       <p15:sldGuideLst xmlns:p15="http://schemas.microsoft.com/office/powerpoint/2012/main">
@@ -2016,7 +2195,7 @@
             <a:spLocks noGrp="1"/>
           </p:cNvSpPr>
           <p:nvPr>
-            <p:ph type="title"/>
+            <p:ph type="title" hasCustomPrompt="1"/>
           </p:nvPr>
         </p:nvSpPr>
         <p:spPr>
@@ -2037,7 +2216,7 @@
           <a:p>
             <a:r>
               <a:rPr lang="en-US" dirty="0"/>
-              <a:t>Click to edit Master title style</a:t>
+              <a:t>CLICK TO EDIT MASTER TITLE STYLE</a:t>
             </a:r>
           </a:p>
         </p:txBody>
@@ -2194,6 +2373,9 @@
   <p:clrMapOvr>
     <a:masterClrMapping/>
   </p:clrMapOvr>
+  <p:transition spd="slow">
+    <p:push dir="u"/>
+  </p:transition>
   <p:extLst>
     <p:ext uri="{DCECCB84-F9BA-43D5-87BE-67443E8EF086}">
       <p15:sldGuideLst xmlns:p15="http://schemas.microsoft.com/office/powerpoint/2012/main">
@@ -2210,6 +2392,225 @@
 
 <file path=ppt/slideLayouts/slideLayout6.xml><?xml version="1.0" encoding="utf-8"?>
 <p:sldLayout xmlns:a="http://schemas.openxmlformats.org/drawingml/2006/main" xmlns:r="http://schemas.openxmlformats.org/officeDocument/2006/relationships" xmlns:p="http://schemas.openxmlformats.org/presentationml/2006/main" preserve="1" userDrawn="1">
+  <p:cSld name="3_JibresLogo with Caption">
+    <p:spTree>
+      <p:nvGrpSpPr>
+        <p:cNvPr id="1" name=""/>
+        <p:cNvGrpSpPr/>
+        <p:nvPr/>
+      </p:nvGrpSpPr>
+      <p:grpSpPr>
+        <a:xfrm>
+          <a:off x="0" y="0"/>
+          <a:ext cx="0" cy="0"/>
+          <a:chOff x="0" y="0"/>
+          <a:chExt cx="0" cy="0"/>
+        </a:xfrm>
+      </p:grpSpPr>
+      <p:sp>
+        <p:nvSpPr>
+          <p:cNvPr id="2" name="Title 1"/>
+          <p:cNvSpPr>
+            <a:spLocks noGrp="1"/>
+          </p:cNvSpPr>
+          <p:nvPr>
+            <p:ph type="title" hasCustomPrompt="1"/>
+          </p:nvPr>
+        </p:nvSpPr>
+        <p:spPr>
+          <a:xfrm>
+            <a:off x="1080000" y="1296000"/>
+            <a:ext cx="2880000" cy="720000"/>
+          </a:xfrm>
+        </p:spPr>
+        <p:txBody>
+          <a:bodyPr anchor="b">
+            <a:noAutofit/>
+          </a:bodyPr>
+          <a:lstStyle>
+            <a:lvl1pPr>
+              <a:defRPr sz="2000" b="0"/>
+            </a:lvl1pPr>
+          </a:lstStyle>
+          <a:p>
+            <a:r>
+              <a:rPr lang="en-US" dirty="0"/>
+              <a:t>CLICK TO EDIT MASTER TITLE STYLE</a:t>
+            </a:r>
+          </a:p>
+        </p:txBody>
+      </p:sp>
+      <p:sp>
+        <p:nvSpPr>
+          <p:cNvPr id="4" name="Text Placeholder 3"/>
+          <p:cNvSpPr>
+            <a:spLocks noGrp="1"/>
+          </p:cNvSpPr>
+          <p:nvPr>
+            <p:ph type="body" sz="half" idx="2"/>
+          </p:nvPr>
+        </p:nvSpPr>
+        <p:spPr>
+          <a:xfrm>
+            <a:off x="1080000" y="2232000"/>
+            <a:ext cx="2880000" cy="2520000"/>
+          </a:xfrm>
+        </p:spPr>
+        <p:txBody>
+          <a:bodyPr>
+            <a:normAutofit/>
+          </a:bodyPr>
+          <a:lstStyle>
+            <a:lvl1pPr marL="0" indent="0">
+              <a:lnSpc>
+                <a:spcPct val="150000"/>
+              </a:lnSpc>
+              <a:spcAft>
+                <a:spcPts val="1000"/>
+              </a:spcAft>
+              <a:buNone/>
+              <a:defRPr sz="1200">
+                <a:latin typeface="IRANSans Light" panose="020B0506030804020204" pitchFamily="34" charset="-78"/>
+                <a:cs typeface="IRANSans Light" panose="020B0506030804020204" pitchFamily="34" charset="-78"/>
+              </a:defRPr>
+            </a:lvl1pPr>
+            <a:lvl2pPr marL="457200" indent="0">
+              <a:buNone/>
+              <a:defRPr sz="1400"/>
+            </a:lvl2pPr>
+            <a:lvl3pPr marL="914400" indent="0">
+              <a:buNone/>
+              <a:defRPr sz="1200"/>
+            </a:lvl3pPr>
+            <a:lvl4pPr marL="1371600" indent="0">
+              <a:buNone/>
+              <a:defRPr sz="1000"/>
+            </a:lvl4pPr>
+            <a:lvl5pPr marL="1828800" indent="0">
+              <a:buNone/>
+              <a:defRPr sz="1000"/>
+            </a:lvl5pPr>
+            <a:lvl6pPr marL="2286000" indent="0">
+              <a:buNone/>
+              <a:defRPr sz="1000"/>
+            </a:lvl6pPr>
+            <a:lvl7pPr marL="2743200" indent="0">
+              <a:buNone/>
+              <a:defRPr sz="1000"/>
+            </a:lvl7pPr>
+            <a:lvl8pPr marL="3200400" indent="0">
+              <a:buNone/>
+              <a:defRPr sz="1000"/>
+            </a:lvl8pPr>
+            <a:lvl9pPr marL="3657600" indent="0">
+              <a:buNone/>
+              <a:defRPr sz="1000"/>
+            </a:lvl9pPr>
+          </a:lstStyle>
+          <a:p>
+            <a:pPr lvl="0"/>
+            <a:r>
+              <a:rPr lang="en-US" dirty="0"/>
+              <a:t>Edit Master text styles</a:t>
+            </a:r>
+          </a:p>
+        </p:txBody>
+      </p:sp>
+      <p:sp>
+        <p:nvSpPr>
+          <p:cNvPr id="7" name="Slide Number Placeholder 6"/>
+          <p:cNvSpPr>
+            <a:spLocks noGrp="1"/>
+          </p:cNvSpPr>
+          <p:nvPr>
+            <p:ph type="sldNum" sz="quarter" idx="12"/>
+          </p:nvPr>
+        </p:nvSpPr>
+        <p:spPr>
+          <a:xfrm>
+            <a:off x="8868064" y="5937599"/>
+            <a:ext cx="2268249" cy="365125"/>
+          </a:xfrm>
+        </p:spPr>
+        <p:txBody>
+          <a:bodyPr/>
+          <a:lstStyle/>
+          <a:p>
+            <a:fld id="{6B8230D4-A52F-48C3-88BB-7CF0A26BA1C5}" type="slidenum">
+              <a:rPr lang="en-US" smtClean="0"/>
+              <a:t>‹#›</a:t>
+            </a:fld>
+            <a:endParaRPr lang="en-US"/>
+          </a:p>
+        </p:txBody>
+      </p:sp>
+      <p:pic>
+        <p:nvPicPr>
+          <p:cNvPr id="6" name="Graphic 5">
+            <a:extLst>
+              <a:ext uri="{FF2B5EF4-FFF2-40B4-BE49-F238E27FC236}">
+                <a16:creationId xmlns:a16="http://schemas.microsoft.com/office/drawing/2014/main" id="{DC583769-5A49-4908-AABC-4063C901E85A}"/>
+              </a:ext>
+            </a:extLst>
+          </p:cNvPr>
+          <p:cNvPicPr>
+            <a:picLocks noChangeAspect="1"/>
+          </p:cNvPicPr>
+          <p:nvPr userDrawn="1"/>
+        </p:nvPicPr>
+        <p:blipFill>
+          <a:blip r:embed="rId2" cstate="print">
+            <a:extLst>
+              <a:ext uri="{28A0092B-C50C-407E-A947-70E740481C1C}">
+                <a14:useLocalDpi xmlns:a14="http://schemas.microsoft.com/office/drawing/2010/main" val="0"/>
+              </a:ext>
+              <a:ext uri="{96DAC541-7B7A-43D3-8B79-37D633B846F1}">
+                <asvg:svgBlip xmlns:asvg="http://schemas.microsoft.com/office/drawing/2016/SVG/main" r:embed="rId3"/>
+              </a:ext>
+            </a:extLst>
+          </a:blip>
+          <a:srcRect/>
+          <a:stretch/>
+        </p:blipFill>
+        <p:spPr>
+          <a:xfrm>
+            <a:off x="5521865" y="252417"/>
+            <a:ext cx="5400000" cy="5400000"/>
+          </a:xfrm>
+          <a:prstGeom prst="rect">
+            <a:avLst/>
+          </a:prstGeom>
+        </p:spPr>
+      </p:pic>
+    </p:spTree>
+    <p:extLst>
+      <p:ext uri="{BB962C8B-B14F-4D97-AF65-F5344CB8AC3E}">
+        <p14:creationId xmlns:p14="http://schemas.microsoft.com/office/powerpoint/2010/main" val="2271934034"/>
+      </p:ext>
+    </p:extLst>
+  </p:cSld>
+  <p:clrMapOvr>
+    <a:masterClrMapping/>
+  </p:clrMapOvr>
+  <p:transition spd="slow">
+    <p:push/>
+  </p:transition>
+  <p:extLst>
+    <p:ext uri="{DCECCB84-F9BA-43D5-87BE-67443E8EF086}">
+      <p15:sldGuideLst xmlns:p15="http://schemas.microsoft.com/office/powerpoint/2012/main">
+        <p15:guide id="1" pos="3840">
+          <p15:clr>
+            <a:srgbClr val="FBAE40"/>
+          </p15:clr>
+        </p15:guide>
+      </p15:sldGuideLst>
+    </p:ext>
+  </p:extLst>
+</p:sldLayout>
+</file>
+
+<file path=ppt/slideLayouts/slideLayout7.xml><?xml version="1.0" encoding="utf-8"?>
+<p:sldLayout xmlns:a="http://schemas.openxmlformats.org/drawingml/2006/main" xmlns:r="http://schemas.openxmlformats.org/officeDocument/2006/relationships" xmlns:p="http://schemas.openxmlformats.org/presentationml/2006/main" preserve="1" userDrawn="1">
   <p:cSld name="1_Picture with Caption">
     <p:spTree>
       <p:nvGrpSpPr>
@@ -2425,6 +2826,9 @@
   <p:clrMapOvr>
     <a:masterClrMapping/>
   </p:clrMapOvr>
+  <p:transition spd="slow">
+    <p:push dir="u"/>
+  </p:transition>
   <p:extLst>
     <p:ext uri="{DCECCB84-F9BA-43D5-87BE-67443E8EF086}">
       <p15:sldGuideLst xmlns:p15="http://schemas.microsoft.com/office/powerpoint/2012/main">
@@ -2439,7 +2843,7 @@
 </p:sldLayout>
 </file>
 
-<file path=ppt/slideLayouts/slideLayout7.xml><?xml version="1.0" encoding="utf-8"?>
+<file path=ppt/slideLayouts/slideLayout8.xml><?xml version="1.0" encoding="utf-8"?>
 <p:sldLayout xmlns:a="http://schemas.openxmlformats.org/drawingml/2006/main" xmlns:r="http://schemas.openxmlformats.org/officeDocument/2006/relationships" xmlns:p="http://schemas.openxmlformats.org/presentationml/2006/main" type="secHead" preserve="1">
   <p:cSld name="Section Header">
     <p:spTree>
@@ -2666,10 +3070,13 @@
   <p:clrMapOvr>
     <a:masterClrMapping/>
   </p:clrMapOvr>
+  <p:transition spd="slow">
+    <p:push dir="u"/>
+  </p:transition>
 </p:sldLayout>
 </file>
 
-<file path=ppt/slideLayouts/slideLayout8.xml><?xml version="1.0" encoding="utf-8"?>
+<file path=ppt/slideLayouts/slideLayout9.xml><?xml version="1.0" encoding="utf-8"?>
 <p:sldLayout xmlns:a="http://schemas.openxmlformats.org/drawingml/2006/main" xmlns:r="http://schemas.openxmlformats.org/officeDocument/2006/relationships" xmlns:p="http://schemas.openxmlformats.org/presentationml/2006/main" type="title" preserve="1">
   <p:cSld name="Title Slide">
     <p:spTree>
@@ -2841,159 +3248,9 @@
   <p:clrMapOvr>
     <a:masterClrMapping/>
   </p:clrMapOvr>
-</p:sldLayout>
-</file>
-
-<file path=ppt/slideLayouts/slideLayout9.xml><?xml version="1.0" encoding="utf-8"?>
-<p:sldLayout xmlns:a="http://schemas.openxmlformats.org/drawingml/2006/main" xmlns:r="http://schemas.openxmlformats.org/officeDocument/2006/relationships" xmlns:p="http://schemas.openxmlformats.org/presentationml/2006/main" type="obj" preserve="1">
-  <p:cSld name="Title and Content">
-    <p:spTree>
-      <p:nvGrpSpPr>
-        <p:cNvPr id="1" name=""/>
-        <p:cNvGrpSpPr/>
-        <p:nvPr/>
-      </p:nvGrpSpPr>
-      <p:grpSpPr>
-        <a:xfrm>
-          <a:off x="0" y="0"/>
-          <a:ext cx="0" cy="0"/>
-          <a:chOff x="0" y="0"/>
-          <a:chExt cx="0" cy="0"/>
-        </a:xfrm>
-      </p:grpSpPr>
-      <p:sp>
-        <p:nvSpPr>
-          <p:cNvPr id="2" name="Title 1"/>
-          <p:cNvSpPr>
-            <a:spLocks noGrp="1"/>
-          </p:cNvSpPr>
-          <p:nvPr>
-            <p:ph type="title"/>
-          </p:nvPr>
-        </p:nvSpPr>
-        <p:spPr/>
-        <p:txBody>
-          <a:bodyPr/>
-          <a:lstStyle/>
-          <a:p>
-            <a:r>
-              <a:rPr lang="en-US"/>
-              <a:t>Click to edit Master title style</a:t>
-            </a:r>
-          </a:p>
-        </p:txBody>
-      </p:sp>
-      <p:sp>
-        <p:nvSpPr>
-          <p:cNvPr id="3" name="Content Placeholder 2"/>
-          <p:cNvSpPr>
-            <a:spLocks noGrp="1"/>
-          </p:cNvSpPr>
-          <p:nvPr>
-            <p:ph idx="1"/>
-          </p:nvPr>
-        </p:nvSpPr>
-        <p:spPr/>
-        <p:txBody>
-          <a:bodyPr/>
-          <a:lstStyle/>
-          <a:p>
-            <a:pPr lvl="0"/>
-            <a:r>
-              <a:rPr lang="en-US"/>
-              <a:t>Edit Master text styles</a:t>
-            </a:r>
-          </a:p>
-          <a:p>
-            <a:pPr lvl="1"/>
-            <a:r>
-              <a:rPr lang="en-US"/>
-              <a:t>Second level</a:t>
-            </a:r>
-          </a:p>
-          <a:p>
-            <a:pPr lvl="2"/>
-            <a:r>
-              <a:rPr lang="en-US"/>
-              <a:t>Third level</a:t>
-            </a:r>
-          </a:p>
-          <a:p>
-            <a:pPr lvl="3"/>
-            <a:r>
-              <a:rPr lang="en-US"/>
-              <a:t>Fourth level</a:t>
-            </a:r>
-          </a:p>
-          <a:p>
-            <a:pPr lvl="4"/>
-            <a:r>
-              <a:rPr lang="en-US"/>
-              <a:t>Fifth level</a:t>
-            </a:r>
-          </a:p>
-        </p:txBody>
-      </p:sp>
-      <p:sp>
-        <p:nvSpPr>
-          <p:cNvPr id="5" name="Footer Placeholder 4"/>
-          <p:cNvSpPr>
-            <a:spLocks noGrp="1"/>
-          </p:cNvSpPr>
-          <p:nvPr>
-            <p:ph type="ftr" sz="quarter" idx="11"/>
-          </p:nvPr>
-        </p:nvSpPr>
-        <p:spPr>
-          <a:xfrm>
-            <a:off x="1055687" y="5943599"/>
-            <a:ext cx="3033045" cy="365125"/>
-          </a:xfrm>
-          <a:prstGeom prst="rect">
-            <a:avLst/>
-          </a:prstGeom>
-        </p:spPr>
-        <p:txBody>
-          <a:bodyPr/>
-          <a:lstStyle/>
-          <a:p>
-            <a:endParaRPr lang="en-US"/>
-          </a:p>
-        </p:txBody>
-      </p:sp>
-      <p:sp>
-        <p:nvSpPr>
-          <p:cNvPr id="6" name="Slide Number Placeholder 5"/>
-          <p:cNvSpPr>
-            <a:spLocks noGrp="1"/>
-          </p:cNvSpPr>
-          <p:nvPr>
-            <p:ph type="sldNum" sz="quarter" idx="12"/>
-          </p:nvPr>
-        </p:nvSpPr>
-        <p:spPr/>
-        <p:txBody>
-          <a:bodyPr/>
-          <a:lstStyle/>
-          <a:p>
-            <a:fld id="{6B8230D4-A52F-48C3-88BB-7CF0A26BA1C5}" type="slidenum">
-              <a:rPr lang="en-US" smtClean="0"/>
-              <a:t>‹#›</a:t>
-            </a:fld>
-            <a:endParaRPr lang="en-US"/>
-          </a:p>
-        </p:txBody>
-      </p:sp>
-    </p:spTree>
-    <p:extLst>
-      <p:ext uri="{BB962C8B-B14F-4D97-AF65-F5344CB8AC3E}">
-        <p14:creationId xmlns:p14="http://schemas.microsoft.com/office/powerpoint/2010/main" val="751939655"/>
-      </p:ext>
-    </p:extLst>
-  </p:cSld>
-  <p:clrMapOvr>
-    <a:masterClrMapping/>
-  </p:clrMapOvr>
+  <p:transition spd="slow">
+    <p:push dir="u"/>
+  </p:transition>
 </p:sldLayout>
 </file>
 
@@ -3045,9 +3302,10 @@
           <a:lstStyle/>
           <a:p>
             <a:r>
-              <a:rPr lang="en-US" dirty="0"/>
+              <a:rPr lang="en-US"/>
               <a:t>Click to edit Master title style</a:t>
             </a:r>
+            <a:endParaRPr lang="en-US" dirty="0"/>
           </a:p>
         </p:txBody>
       </p:sp>
@@ -3218,13 +3476,13 @@
           <p:nvPr userDrawn="1"/>
         </p:nvPicPr>
         <p:blipFill>
-          <a:blip r:embed="rId14" cstate="print">
+          <a:blip r:embed="rId15" cstate="print">
             <a:extLst>
               <a:ext uri="{28A0092B-C50C-407E-A947-70E740481C1C}">
                 <a14:useLocalDpi xmlns:a14="http://schemas.microsoft.com/office/drawing/2010/main" val="0"/>
               </a:ext>
               <a:ext uri="{96DAC541-7B7A-43D3-8B79-37D633B846F1}">
-                <asvg:svgBlip xmlns:asvg="http://schemas.microsoft.com/office/drawing/2016/SVG/main" r:embed="rId15"/>
+                <asvg:svgBlip xmlns:asvg="http://schemas.microsoft.com/office/drawing/2016/SVG/main" r:embed="rId16"/>
               </a:ext>
             </a:extLst>
           </a:blip>
@@ -3256,14 +3514,18 @@
     <p:sldLayoutId id="2147483666" r:id="rId3"/>
     <p:sldLayoutId id="2147483668" r:id="rId4"/>
     <p:sldLayoutId id="2147483669" r:id="rId5"/>
-    <p:sldLayoutId id="2147483665" r:id="rId6"/>
-    <p:sldLayoutId id="2147483651" r:id="rId7"/>
-    <p:sldLayoutId id="2147483649" r:id="rId8"/>
-    <p:sldLayoutId id="2147483650" r:id="rId9"/>
-    <p:sldLayoutId id="2147483652" r:id="rId10"/>
-    <p:sldLayoutId id="2147483654" r:id="rId11"/>
-    <p:sldLayoutId id="2147483660" r:id="rId12"/>
+    <p:sldLayoutId id="2147483670" r:id="rId6"/>
+    <p:sldLayoutId id="2147483665" r:id="rId7"/>
+    <p:sldLayoutId id="2147483651" r:id="rId8"/>
+    <p:sldLayoutId id="2147483649" r:id="rId9"/>
+    <p:sldLayoutId id="2147483650" r:id="rId10"/>
+    <p:sldLayoutId id="2147483652" r:id="rId11"/>
+    <p:sldLayoutId id="2147483654" r:id="rId12"/>
+    <p:sldLayoutId id="2147483660" r:id="rId13"/>
   </p:sldLayoutIdLst>
+  <p:transition spd="slow">
+    <p:push dir="u"/>
+  </p:transition>
   <p:hf hdr="0" ftr="0" dt="0"/>
   <p:txStyles>
     <p:titleStyle>
@@ -4049,9 +4311,18 @@
   <p:clrMapOvr>
     <a:masterClrMapping/>
   </p:clrMapOvr>
-  <p:transition spd="slow">
-    <p:cover dir="d"/>
-  </p:transition>
+  <mc:AlternateContent xmlns:mc="http://schemas.openxmlformats.org/markup-compatibility/2006">
+    <mc:Choice xmlns:p14="http://schemas.microsoft.com/office/powerpoint/2010/main" Requires="p14">
+      <p:transition spd="slow" p14:dur="1600">
+        <p:blinds dir="vert"/>
+      </p:transition>
+    </mc:Choice>
+    <mc:Fallback>
+      <p:transition spd="slow">
+        <p:blinds dir="vert"/>
+      </p:transition>
+    </mc:Fallback>
+  </mc:AlternateContent>
 </p:sld>
 </file>
 
@@ -4203,6 +4474,9 @@
   <p:clrMapOvr>
     <a:masterClrMapping/>
   </p:clrMapOvr>
+  <p:transition spd="slow">
+    <p:push dir="u"/>
+  </p:transition>
 </p:sld>
 </file>
 
@@ -4362,6 +4636,9 @@
   <p:clrMapOvr>
     <a:masterClrMapping/>
   </p:clrMapOvr>
+  <p:transition spd="slow">
+    <p:push dir="u"/>
+  </p:transition>
 </p:sld>
 </file>
 
@@ -4384,6 +4661,122 @@
       </p:grpSpPr>
       <p:sp>
         <p:nvSpPr>
+          <p:cNvPr id="2" name="Title 1">
+            <a:extLst>
+              <a:ext uri="{FF2B5EF4-FFF2-40B4-BE49-F238E27FC236}">
+                <a16:creationId xmlns:a16="http://schemas.microsoft.com/office/drawing/2014/main" id="{552A41D2-B180-436D-BB7B-7969DA62054B}"/>
+              </a:ext>
+            </a:extLst>
+          </p:cNvPr>
+          <p:cNvSpPr>
+            <a:spLocks noGrp="1"/>
+          </p:cNvSpPr>
+          <p:nvPr>
+            <p:ph type="title"/>
+          </p:nvPr>
+        </p:nvSpPr>
+        <p:spPr/>
+        <p:txBody>
+          <a:bodyPr/>
+          <a:lstStyle/>
+          <a:p>
+            <a:r>
+              <a:rPr lang="en-US" dirty="0"/>
+              <a:t>ICON DRAW RULES</a:t>
+            </a:r>
+          </a:p>
+        </p:txBody>
+      </p:sp>
+      <p:sp>
+        <p:nvSpPr>
+          <p:cNvPr id="11" name="Text Placeholder 10">
+            <a:extLst>
+              <a:ext uri="{FF2B5EF4-FFF2-40B4-BE49-F238E27FC236}">
+                <a16:creationId xmlns:a16="http://schemas.microsoft.com/office/drawing/2014/main" id="{ADE4E85D-DB5D-4B3E-8BC3-62487EDE031E}"/>
+              </a:ext>
+            </a:extLst>
+          </p:cNvPr>
+          <p:cNvSpPr>
+            <a:spLocks noGrp="1"/>
+          </p:cNvSpPr>
+          <p:nvPr>
+            <p:ph type="body" sz="half" idx="2"/>
+          </p:nvPr>
+        </p:nvSpPr>
+        <p:spPr/>
+        <p:txBody>
+          <a:bodyPr/>
+          <a:lstStyle/>
+          <a:p>
+            <a:endParaRPr lang="en-US"/>
+          </a:p>
+        </p:txBody>
+      </p:sp>
+      <p:sp>
+        <p:nvSpPr>
+          <p:cNvPr id="4" name="Slide Number Placeholder 3">
+            <a:extLst>
+              <a:ext uri="{FF2B5EF4-FFF2-40B4-BE49-F238E27FC236}">
+                <a16:creationId xmlns:a16="http://schemas.microsoft.com/office/drawing/2014/main" id="{C8D36FD0-7C5C-48B8-9481-43EC7E9C9197}"/>
+              </a:ext>
+            </a:extLst>
+          </p:cNvPr>
+          <p:cNvSpPr>
+            <a:spLocks noGrp="1"/>
+          </p:cNvSpPr>
+          <p:nvPr>
+            <p:ph type="sldNum" sz="quarter" idx="12"/>
+          </p:nvPr>
+        </p:nvSpPr>
+        <p:spPr/>
+        <p:txBody>
+          <a:bodyPr/>
+          <a:lstStyle/>
+          <a:p>
+            <a:fld id="{6B8230D4-A52F-48C3-88BB-7CF0A26BA1C5}" type="slidenum">
+              <a:rPr lang="en-US" smtClean="0"/>
+              <a:pPr/>
+              <a:t>12</a:t>
+            </a:fld>
+            <a:endParaRPr lang="en-US"/>
+          </a:p>
+        </p:txBody>
+      </p:sp>
+    </p:spTree>
+    <p:extLst>
+      <p:ext uri="{BB962C8B-B14F-4D97-AF65-F5344CB8AC3E}">
+        <p14:creationId xmlns:p14="http://schemas.microsoft.com/office/powerpoint/2010/main" val="902224127"/>
+      </p:ext>
+    </p:extLst>
+  </p:cSld>
+  <p:clrMapOvr>
+    <a:masterClrMapping/>
+  </p:clrMapOvr>
+  <p:transition spd="slow">
+    <p:push/>
+  </p:transition>
+</p:sld>
+</file>
+
+<file path=ppt/slides/slide13.xml><?xml version="1.0" encoding="utf-8"?>
+<p:sld xmlns:a="http://schemas.openxmlformats.org/drawingml/2006/main" xmlns:r="http://schemas.openxmlformats.org/officeDocument/2006/relationships" xmlns:p="http://schemas.openxmlformats.org/presentationml/2006/main">
+  <p:cSld>
+    <p:spTree>
+      <p:nvGrpSpPr>
+        <p:cNvPr id="1" name=""/>
+        <p:cNvGrpSpPr/>
+        <p:nvPr/>
+      </p:nvGrpSpPr>
+      <p:grpSpPr>
+        <a:xfrm>
+          <a:off x="0" y="0"/>
+          <a:ext cx="0" cy="0"/>
+          <a:chOff x="0" y="0"/>
+          <a:chExt cx="0" cy="0"/>
+        </a:xfrm>
+      </p:grpSpPr>
+      <p:sp>
+        <p:nvSpPr>
           <p:cNvPr id="2" name="Title 1"/>
           <p:cNvSpPr>
             <a:spLocks noGrp="1"/>
@@ -4473,7 +4866,7 @@
           <a:p>
             <a:fld id="{6B8230D4-A52F-48C3-88BB-7CF0A26BA1C5}" type="slidenum">
               <a:rPr lang="en-US" smtClean="0"/>
-              <a:t>12</a:t>
+              <a:t>13</a:t>
             </a:fld>
             <a:endParaRPr lang="en-US"/>
           </a:p>
@@ -4589,10 +4982,13 @@
   <p:clrMapOvr>
     <a:masterClrMapping/>
   </p:clrMapOvr>
+  <p:transition spd="slow">
+    <p:push dir="u"/>
+  </p:transition>
 </p:sld>
 </file>
 
-<file path=ppt/slides/slide13.xml><?xml version="1.0" encoding="utf-8"?>
+<file path=ppt/slides/slide14.xml><?xml version="1.0" encoding="utf-8"?>
 <p:sld xmlns:a="http://schemas.openxmlformats.org/drawingml/2006/main" xmlns:r="http://schemas.openxmlformats.org/officeDocument/2006/relationships" xmlns:p="http://schemas.openxmlformats.org/presentationml/2006/main">
   <p:cSld>
     <p:spTree>
@@ -4696,7 +5092,7 @@
           <a:p>
             <a:fld id="{6B8230D4-A52F-48C3-88BB-7CF0A26BA1C5}" type="slidenum">
               <a:rPr lang="en-US" smtClean="0"/>
-              <a:t>13</a:t>
+              <a:t>14</a:t>
             </a:fld>
             <a:endParaRPr lang="en-US"/>
           </a:p>
@@ -4742,10 +5138,13 @@
   <p:clrMapOvr>
     <a:masterClrMapping/>
   </p:clrMapOvr>
+  <p:transition spd="slow">
+    <p:push/>
+  </p:transition>
 </p:sld>
 </file>
 
-<file path=ppt/slides/slide14.xml><?xml version="1.0" encoding="utf-8"?>
+<file path=ppt/slides/slide15.xml><?xml version="1.0" encoding="utf-8"?>
 <p:sld xmlns:a="http://schemas.openxmlformats.org/drawingml/2006/main" xmlns:r="http://schemas.openxmlformats.org/officeDocument/2006/relationships" xmlns:p="http://schemas.openxmlformats.org/presentationml/2006/main">
   <p:cSld>
     <p:spTree>
@@ -4806,7 +5205,7 @@
     <a:masterClrMapping/>
   </p:clrMapOvr>
   <p:transition spd="slow">
-    <p:push dir="u"/>
+    <p:push/>
   </p:transition>
 </p:sld>
 </file>
@@ -4912,6 +5311,9 @@
   <p:clrMapOvr>
     <a:masterClrMapping/>
   </p:clrMapOvr>
+  <p:transition spd="slow">
+    <p:push dir="u"/>
+  </p:transition>
 </p:sld>
 </file>
 
@@ -5379,6 +5781,9 @@
   <p:clrMapOvr>
     <a:masterClrMapping/>
   </p:clrMapOvr>
+  <p:transition spd="slow">
+    <p:push dir="u"/>
+  </p:transition>
 </p:sld>
 </file>
 
@@ -5477,6 +5882,9 @@
   <p:clrMapOvr>
     <a:masterClrMapping/>
   </p:clrMapOvr>
+  <p:transition spd="slow">
+    <p:push dir="u"/>
+  </p:transition>
 </p:sld>
 </file>
 
@@ -5575,6 +5983,9 @@
   <p:clrMapOvr>
     <a:masterClrMapping/>
   </p:clrMapOvr>
+  <p:transition spd="slow">
+    <p:push dir="u"/>
+  </p:transition>
 </p:sld>
 </file>
 
@@ -5619,24 +6030,6 @@
       </p:sp>
       <p:sp>
         <p:nvSpPr>
-          <p:cNvPr id="6" name="Picture Placeholder 5">
-            <a:extLst>
-              <a:ext uri="{FF2B5EF4-FFF2-40B4-BE49-F238E27FC236}">
-                <a16:creationId xmlns:a16="http://schemas.microsoft.com/office/drawing/2014/main" id="{64D11ABA-AB72-4DC3-A3A4-40FA1F6562F3}"/>
-              </a:ext>
-            </a:extLst>
-          </p:cNvPr>
-          <p:cNvSpPr>
-            <a:spLocks noGrp="1"/>
-          </p:cNvSpPr>
-          <p:nvPr>
-            <p:ph type="pic" idx="1"/>
-          </p:nvPr>
-        </p:nvSpPr>
-        <p:spPr/>
-      </p:sp>
-      <p:sp>
-        <p:nvSpPr>
           <p:cNvPr id="3" name="Content Placeholder 2"/>
           <p:cNvSpPr>
             <a:spLocks noGrp="1"/>
@@ -5658,7 +6051,7 @@
           <a:p>
             <a:r>
               <a:rPr lang="en-US" dirty="0"/>
-              <a:t>This space is the minimum distance needed and is equal to half the height of the icon.</a:t>
+              <a:t>This space is the minimum distance needed and is equal to third the height of the icon.</a:t>
             </a:r>
           </a:p>
         </p:txBody>
@@ -5680,6 +6073,7 @@
           <a:p>
             <a:fld id="{6B8230D4-A52F-48C3-88BB-7CF0A26BA1C5}" type="slidenum">
               <a:rPr lang="en-US" smtClean="0"/>
+              <a:pPr/>
               <a:t>7</a:t>
             </a:fld>
             <a:endParaRPr lang="en-US"/>
@@ -5726,6 +6120,9 @@
   <p:clrMapOvr>
     <a:masterClrMapping/>
   </p:clrMapOvr>
+  <p:transition spd="slow">
+    <p:push/>
+  </p:transition>
 </p:sld>
 </file>
 
@@ -6420,6 +6817,9 @@
   <p:clrMapOvr>
     <a:masterClrMapping/>
   </p:clrMapOvr>
+  <p:transition spd="slow">
+    <p:push dir="u"/>
+  </p:transition>
 </p:sld>
 </file>
 
@@ -6600,6 +7000,9 @@
   <p:clrMapOvr>
     <a:masterClrMapping/>
   </p:clrMapOvr>
+  <p:transition spd="slow">
+    <p:push dir="r"/>
+  </p:transition>
 </p:sld>
 </file>
 

</xml_diff>

<commit_message>
only one page is remain
</commit_message>
<xml_diff>
--- a/styleguide/Jibres-brand-styleguide.pptx
+++ b/styleguide/Jibres-brand-styleguide.pptx
@@ -20,8 +20,8 @@
     <p:sldId id="264" r:id="rId11"/>
     <p:sldId id="265" r:id="rId12"/>
     <p:sldId id="266" r:id="rId13"/>
-    <p:sldId id="270" r:id="rId14"/>
-    <p:sldId id="267" r:id="rId15"/>
+    <p:sldId id="267" r:id="rId14"/>
+    <p:sldId id="271" r:id="rId15"/>
     <p:sldId id="268" r:id="rId16"/>
     <p:sldId id="269" r:id="rId17"/>
   </p:sldIdLst>
@@ -138,8 +138,8 @@
             <p14:sldId id="264"/>
             <p14:sldId id="265"/>
             <p14:sldId id="266"/>
-            <p14:sldId id="270"/>
             <p14:sldId id="267"/>
+            <p14:sldId id="271"/>
             <p14:sldId id="268"/>
             <p14:sldId id="269"/>
           </p14:sldIdLst>
@@ -148,7 +148,7 @@
     </p:ext>
     <p:ext uri="{EFAFB233-063F-42B5-8137-9DF3F51BA10A}">
       <p15:sldGuideLst xmlns:p15="http://schemas.microsoft.com/office/powerpoint/2012/main">
-        <p15:guide id="1" orient="horz" pos="2160" userDrawn="1">
+        <p15:guide id="1" orient="horz" pos="2840" userDrawn="1">
           <p15:clr>
             <a:srgbClr val="A4A3A4"/>
           </p15:clr>
@@ -1390,6 +1390,91 @@
 </file>
 
 <file path=ppt/slideLayouts/slideLayout15.xml><?xml version="1.0" encoding="utf-8"?>
+<p:sldLayout xmlns:a="http://schemas.openxmlformats.org/drawingml/2006/main" xmlns:r="http://schemas.openxmlformats.org/officeDocument/2006/relationships" xmlns:p="http://schemas.openxmlformats.org/presentationml/2006/main" type="blank" preserve="1">
+  <p:cSld name="draw-rules">
+    <p:bg>
+      <p:bgPr>
+        <a:solidFill>
+          <a:schemeClr val="accent3">
+            <a:lumMod val="20000"/>
+            <a:lumOff val="80000"/>
+          </a:schemeClr>
+        </a:solidFill>
+        <a:effectLst/>
+      </p:bgPr>
+    </p:bg>
+    <p:spTree>
+      <p:nvGrpSpPr>
+        <p:cNvPr id="1" name=""/>
+        <p:cNvGrpSpPr/>
+        <p:nvPr/>
+      </p:nvGrpSpPr>
+      <p:grpSpPr>
+        <a:xfrm>
+          <a:off x="0" y="0"/>
+          <a:ext cx="0" cy="0"/>
+          <a:chOff x="0" y="0"/>
+          <a:chExt cx="0" cy="0"/>
+        </a:xfrm>
+      </p:grpSpPr>
+      <p:pic>
+        <p:nvPicPr>
+          <p:cNvPr id="6" name="Picture 5"/>
+          <p:cNvPicPr>
+            <a:picLocks noChangeAspect="1"/>
+          </p:cNvPicPr>
+          <p:nvPr userDrawn="1"/>
+        </p:nvPicPr>
+        <p:blipFill>
+          <a:blip r:embed="rId2" cstate="print">
+            <a:extLst>
+              <a:ext uri="{28A0092B-C50C-407E-A947-70E740481C1C}">
+                <a14:useLocalDpi xmlns:a14="http://schemas.microsoft.com/office/drawing/2010/main" val="0"/>
+              </a:ext>
+              <a:ext uri="{96DAC541-7B7A-43D3-8B79-37D633B846F1}">
+                <asvg:svgBlip xmlns:asvg="http://schemas.microsoft.com/office/drawing/2016/SVG/main" r:embed="rId3"/>
+              </a:ext>
+            </a:extLst>
+          </a:blip>
+          <a:srcRect/>
+          <a:stretch/>
+        </p:blipFill>
+        <p:spPr>
+          <a:xfrm>
+            <a:off x="3396000" y="729000"/>
+            <a:ext cx="5400000" cy="5400000"/>
+          </a:xfrm>
+          <a:prstGeom prst="rect">
+            <a:avLst/>
+          </a:prstGeom>
+        </p:spPr>
+      </p:pic>
+    </p:spTree>
+    <p:extLst>
+      <p:ext uri="{BB962C8B-B14F-4D97-AF65-F5344CB8AC3E}">
+        <p14:creationId xmlns:p14="http://schemas.microsoft.com/office/powerpoint/2010/main" val="2652634018"/>
+      </p:ext>
+    </p:extLst>
+  </p:cSld>
+  <p:clrMapOvr>
+    <a:masterClrMapping/>
+  </p:clrMapOvr>
+  <mc:AlternateContent xmlns:mc="http://schemas.openxmlformats.org/markup-compatibility/2006">
+    <mc:Choice xmlns:p14="http://schemas.microsoft.com/office/powerpoint/2010/main" Requires="p14">
+      <p:transition spd="slow" p14:dur="1600">
+        <p:blinds dir="vert"/>
+      </p:transition>
+    </mc:Choice>
+    <mc:Fallback>
+      <p:transition spd="slow">
+        <p:blinds dir="vert"/>
+      </p:transition>
+    </mc:Fallback>
+  </mc:AlternateContent>
+</p:sldLayout>
+</file>
+
+<file path=ppt/slideLayouts/slideLayout16.xml><?xml version="1.0" encoding="utf-8"?>
 <p:sldLayout xmlns:a="http://schemas.openxmlformats.org/drawingml/2006/main" xmlns:r="http://schemas.openxmlformats.org/officeDocument/2006/relationships" xmlns:p="http://schemas.openxmlformats.org/presentationml/2006/main" preserve="1" userDrawn="1">
   <p:cSld name="Intro">
     <p:spTree>
@@ -3998,7 +4083,8 @@
   <p:clrMap bg1="lt1" tx1="dk1" bg2="lt2" tx2="dk2" accent1="accent1" accent2="accent2" accent3="accent3" accent4="accent4" accent5="accent5" accent6="accent6" hlink="hlink" folHlink="folHlink"/>
   <p:sldLayoutIdLst>
     <p:sldLayoutId id="2147483655" r:id="rId1"/>
-    <p:sldLayoutId id="2147483661" r:id="rId2"/>
+    <p:sldLayoutId id="2147483672" r:id="rId2"/>
+    <p:sldLayoutId id="2147483661" r:id="rId3"/>
   </p:sldLayoutIdLst>
   <p:hf hdr="0" ftr="0" dt="0"/>
   <p:txStyles>
@@ -4367,24 +4453,6 @@
       </p:sp>
       <p:sp>
         <p:nvSpPr>
-          <p:cNvPr id="6" name="Picture Placeholder 5">
-            <a:extLst>
-              <a:ext uri="{FF2B5EF4-FFF2-40B4-BE49-F238E27FC236}">
-                <a16:creationId xmlns:a16="http://schemas.microsoft.com/office/drawing/2014/main" id="{7133E2A7-9877-4A52-ACFC-DBCA0D39FCD9}"/>
-              </a:ext>
-            </a:extLst>
-          </p:cNvPr>
-          <p:cNvSpPr>
-            <a:spLocks noGrp="1"/>
-          </p:cNvSpPr>
-          <p:nvPr>
-            <p:ph type="pic" idx="1"/>
-          </p:nvPr>
-        </p:nvSpPr>
-        <p:spPr/>
-      </p:sp>
-      <p:sp>
-        <p:nvSpPr>
           <p:cNvPr id="3" name="Content Placeholder 2"/>
           <p:cNvSpPr>
             <a:spLocks noGrp="1"/>
@@ -4400,7 +4468,7 @@
           <a:p>
             <a:r>
               <a:rPr lang="en-US" dirty="0"/>
-              <a:t>If the color logotype isn’t an option for technical reasons, use the white or black versions instead. </a:t>
+              <a:t>If the color logotype isn’t an option for technical reasons, use the black or white versions instead. </a:t>
             </a:r>
           </a:p>
           <a:p>
@@ -4448,22 +4516,175 @@
           </p:cNvPicPr>
           <p:nvPr/>
         </p:nvPicPr>
+        <p:blipFill rotWithShape="1">
+          <a:blip r:embed="rId2"/>
+          <a:srcRect l="11628" t="70804" r="7642" b="16227"/>
+          <a:stretch/>
+        </p:blipFill>
+        <p:spPr>
+          <a:xfrm>
+            <a:off x="6763107" y="4083454"/>
+            <a:ext cx="3260785" cy="491706"/>
+          </a:xfrm>
+          <a:prstGeom prst="rect">
+            <a:avLst/>
+          </a:prstGeom>
+        </p:spPr>
+      </p:pic>
+      <p:pic>
+        <p:nvPicPr>
+          <p:cNvPr id="8" name="Graphic 7">
+            <a:extLst>
+              <a:ext uri="{FF2B5EF4-FFF2-40B4-BE49-F238E27FC236}">
+                <a16:creationId xmlns:a16="http://schemas.microsoft.com/office/drawing/2014/main" id="{82B26C14-2A30-4984-8312-48A019BA929F}"/>
+              </a:ext>
+            </a:extLst>
+          </p:cNvPr>
+          <p:cNvPicPr>
+            <a:picLocks noChangeAspect="1"/>
+          </p:cNvPicPr>
+          <p:nvPr/>
+        </p:nvPicPr>
         <p:blipFill>
-          <a:blip r:embed="rId2"/>
+          <a:blip r:embed="rId3" cstate="print">
+            <a:extLst>
+              <a:ext uri="{28A0092B-C50C-407E-A947-70E740481C1C}">
+                <a14:useLocalDpi xmlns:a14="http://schemas.microsoft.com/office/drawing/2010/main" val="0"/>
+              </a:ext>
+              <a:ext uri="{96DAC541-7B7A-43D3-8B79-37D633B846F1}">
+                <asvg:svgBlip xmlns:asvg="http://schemas.microsoft.com/office/drawing/2016/SVG/main" r:embed="rId4"/>
+              </a:ext>
+            </a:extLst>
+          </a:blip>
           <a:stretch>
             <a:fillRect/>
           </a:stretch>
         </p:blipFill>
         <p:spPr>
           <a:xfrm>
-            <a:off x="5879338" y="2051349"/>
-            <a:ext cx="4039164" cy="3791479"/>
+            <a:off x="6822625" y="1378400"/>
+            <a:ext cx="2880000" cy="1241379"/>
           </a:xfrm>
           <a:prstGeom prst="rect">
             <a:avLst/>
           </a:prstGeom>
         </p:spPr>
       </p:pic>
+      <p:grpSp>
+        <p:nvGrpSpPr>
+          <p:cNvPr id="13" name="Group 12">
+            <a:extLst>
+              <a:ext uri="{FF2B5EF4-FFF2-40B4-BE49-F238E27FC236}">
+                <a16:creationId xmlns:a16="http://schemas.microsoft.com/office/drawing/2014/main" id="{0B08CE5C-D21D-407B-B577-C8D2F03DC847}"/>
+              </a:ext>
+            </a:extLst>
+          </p:cNvPr>
+          <p:cNvGrpSpPr/>
+          <p:nvPr/>
+        </p:nvGrpSpPr>
+        <p:grpSpPr>
+          <a:xfrm>
+            <a:off x="6822625" y="2808253"/>
+            <a:ext cx="2880000" cy="1242000"/>
+            <a:chOff x="8868173" y="3429000"/>
+            <a:chExt cx="2880000" cy="1242000"/>
+          </a:xfrm>
+        </p:grpSpPr>
+        <p:sp>
+          <p:nvSpPr>
+            <p:cNvPr id="9" name="Rectangle 8">
+              <a:extLst>
+                <a:ext uri="{FF2B5EF4-FFF2-40B4-BE49-F238E27FC236}">
+                  <a16:creationId xmlns:a16="http://schemas.microsoft.com/office/drawing/2014/main" id="{51F55B08-5F26-4D5B-A848-D9E7EDC1D9B8}"/>
+                </a:ext>
+              </a:extLst>
+            </p:cNvPr>
+            <p:cNvSpPr/>
+            <p:nvPr/>
+          </p:nvSpPr>
+          <p:spPr>
+            <a:xfrm>
+              <a:off x="8868173" y="3429000"/>
+              <a:ext cx="2880000" cy="1242000"/>
+            </a:xfrm>
+            <a:prstGeom prst="rect">
+              <a:avLst/>
+            </a:prstGeom>
+            <a:solidFill>
+              <a:schemeClr val="tx1">
+                <a:lumMod val="50000"/>
+                <a:lumOff val="50000"/>
+              </a:schemeClr>
+            </a:solidFill>
+            <a:ln>
+              <a:noFill/>
+            </a:ln>
+          </p:spPr>
+          <p:style>
+            <a:lnRef idx="2">
+              <a:schemeClr val="accent3">
+                <a:shade val="50000"/>
+              </a:schemeClr>
+            </a:lnRef>
+            <a:fillRef idx="1">
+              <a:schemeClr val="accent3"/>
+            </a:fillRef>
+            <a:effectRef idx="0">
+              <a:schemeClr val="accent3"/>
+            </a:effectRef>
+            <a:fontRef idx="minor">
+              <a:schemeClr val="lt1"/>
+            </a:fontRef>
+          </p:style>
+          <p:txBody>
+            <a:bodyPr rtlCol="0" anchor="ctr"/>
+            <a:lstStyle/>
+            <a:p>
+              <a:pPr algn="ctr"/>
+              <a:endParaRPr lang="en-US"/>
+            </a:p>
+          </p:txBody>
+        </p:sp>
+        <p:pic>
+          <p:nvPicPr>
+            <p:cNvPr id="11" name="Graphic 10">
+              <a:extLst>
+                <a:ext uri="{FF2B5EF4-FFF2-40B4-BE49-F238E27FC236}">
+                  <a16:creationId xmlns:a16="http://schemas.microsoft.com/office/drawing/2014/main" id="{7B61BBD6-9FB3-4197-8112-6834CE69CAD3}"/>
+                </a:ext>
+              </a:extLst>
+            </p:cNvPr>
+            <p:cNvPicPr>
+              <a:picLocks noChangeAspect="1"/>
+            </p:cNvPicPr>
+            <p:nvPr/>
+          </p:nvPicPr>
+          <p:blipFill>
+            <a:blip r:embed="rId5" cstate="print">
+              <a:extLst>
+                <a:ext uri="{28A0092B-C50C-407E-A947-70E740481C1C}">
+                  <a14:useLocalDpi xmlns:a14="http://schemas.microsoft.com/office/drawing/2010/main" val="0"/>
+                </a:ext>
+                <a:ext uri="{96DAC541-7B7A-43D3-8B79-37D633B846F1}">
+                  <asvg:svgBlip xmlns:asvg="http://schemas.microsoft.com/office/drawing/2016/SVG/main" r:embed="rId6"/>
+                </a:ext>
+              </a:extLst>
+            </a:blip>
+            <a:stretch>
+              <a:fillRect/>
+            </a:stretch>
+          </p:blipFill>
+          <p:spPr>
+            <a:xfrm>
+              <a:off x="8868173" y="3429000"/>
+              <a:ext cx="2880000" cy="1241379"/>
+            </a:xfrm>
+            <a:prstGeom prst="rect">
+              <a:avLst/>
+            </a:prstGeom>
+          </p:spPr>
+        </p:pic>
+      </p:grpSp>
     </p:spTree>
     <p:extLst>
       <p:ext uri="{BB962C8B-B14F-4D97-AF65-F5344CB8AC3E}">
@@ -4521,24 +4742,6 @@
       </p:sp>
       <p:sp>
         <p:nvSpPr>
-          <p:cNvPr id="6" name="Picture Placeholder 5">
-            <a:extLst>
-              <a:ext uri="{FF2B5EF4-FFF2-40B4-BE49-F238E27FC236}">
-                <a16:creationId xmlns:a16="http://schemas.microsoft.com/office/drawing/2014/main" id="{CF2EC9F8-49F2-4B1B-B285-80ECC15825FA}"/>
-              </a:ext>
-            </a:extLst>
-          </p:cNvPr>
-          <p:cNvSpPr>
-            <a:spLocks noGrp="1"/>
-          </p:cNvSpPr>
-          <p:nvPr>
-            <p:ph type="pic" idx="1"/>
-          </p:nvPr>
-        </p:nvSpPr>
-        <p:spPr/>
-      </p:sp>
-      <p:sp>
-        <p:nvSpPr>
           <p:cNvPr id="3" name="Content Placeholder 2"/>
           <p:cNvSpPr>
             <a:spLocks noGrp="1"/>
@@ -4550,7 +4753,7 @@
         <p:spPr/>
         <p:txBody>
           <a:bodyPr>
-            <a:normAutofit lnSpcReduction="10000"/>
+            <a:normAutofit fontScale="85000" lnSpcReduction="10000"/>
           </a:bodyPr>
           <a:lstStyle/>
           <a:p>
@@ -4596,36 +4799,234 @@
           </a:p>
         </p:txBody>
       </p:sp>
-      <p:pic>
-        <p:nvPicPr>
-          <p:cNvPr id="4" name="Picture 3">
+      <p:grpSp>
+        <p:nvGrpSpPr>
+          <p:cNvPr id="14" name="Group 13">
             <a:extLst>
               <a:ext uri="{FF2B5EF4-FFF2-40B4-BE49-F238E27FC236}">
-                <a16:creationId xmlns:a16="http://schemas.microsoft.com/office/drawing/2014/main" id="{EDDB0C94-AB7B-4C69-8601-D41B7F16F5F2}"/>
+                <a16:creationId xmlns:a16="http://schemas.microsoft.com/office/drawing/2014/main" id="{E469D40C-9483-4125-A68E-3A8B6669AF94}"/>
               </a:ext>
             </a:extLst>
           </p:cNvPr>
-          <p:cNvPicPr>
-            <a:picLocks noChangeAspect="1"/>
-          </p:cNvPicPr>
+          <p:cNvGrpSpPr/>
           <p:nvPr/>
-        </p:nvPicPr>
-        <p:blipFill>
-          <a:blip r:embed="rId2"/>
-          <a:stretch>
-            <a:fillRect/>
-          </a:stretch>
-        </p:blipFill>
-        <p:spPr>
+        </p:nvGrpSpPr>
+        <p:grpSpPr>
           <a:xfrm>
-            <a:off x="6386652" y="1973672"/>
-            <a:ext cx="3734321" cy="3734321"/>
+            <a:off x="6812727" y="3279301"/>
+            <a:ext cx="2880000" cy="1242000"/>
+            <a:chOff x="6812727" y="3408697"/>
+            <a:chExt cx="2880000" cy="1242000"/>
           </a:xfrm>
-          <a:prstGeom prst="rect">
-            <a:avLst/>
-          </a:prstGeom>
-        </p:spPr>
-      </p:pic>
+        </p:grpSpPr>
+        <p:sp>
+          <p:nvSpPr>
+            <p:cNvPr id="9" name="Rectangle 8">
+              <a:extLst>
+                <a:ext uri="{FF2B5EF4-FFF2-40B4-BE49-F238E27FC236}">
+                  <a16:creationId xmlns:a16="http://schemas.microsoft.com/office/drawing/2014/main" id="{22126F6A-FCA9-4119-BD24-901DB6466B9C}"/>
+                </a:ext>
+              </a:extLst>
+            </p:cNvPr>
+            <p:cNvSpPr/>
+            <p:nvPr/>
+          </p:nvSpPr>
+          <p:spPr>
+            <a:xfrm>
+              <a:off x="6812727" y="3408697"/>
+              <a:ext cx="2880000" cy="1242000"/>
+            </a:xfrm>
+            <a:prstGeom prst="rect">
+              <a:avLst/>
+            </a:prstGeom>
+            <a:solidFill>
+              <a:schemeClr val="accent4">
+                <a:lumMod val="75000"/>
+              </a:schemeClr>
+            </a:solidFill>
+            <a:ln>
+              <a:noFill/>
+            </a:ln>
+          </p:spPr>
+          <p:style>
+            <a:lnRef idx="2">
+              <a:schemeClr val="accent3">
+                <a:shade val="50000"/>
+              </a:schemeClr>
+            </a:lnRef>
+            <a:fillRef idx="1">
+              <a:schemeClr val="accent3"/>
+            </a:fillRef>
+            <a:effectRef idx="0">
+              <a:schemeClr val="accent3"/>
+            </a:effectRef>
+            <a:fontRef idx="minor">
+              <a:schemeClr val="lt1"/>
+            </a:fontRef>
+          </p:style>
+          <p:txBody>
+            <a:bodyPr rtlCol="0" anchor="ctr"/>
+            <a:lstStyle/>
+            <a:p>
+              <a:pPr algn="ctr"/>
+              <a:endParaRPr lang="en-US"/>
+            </a:p>
+          </p:txBody>
+        </p:sp>
+        <p:pic>
+          <p:nvPicPr>
+            <p:cNvPr id="10" name="Graphic 9">
+              <a:extLst>
+                <a:ext uri="{FF2B5EF4-FFF2-40B4-BE49-F238E27FC236}">
+                  <a16:creationId xmlns:a16="http://schemas.microsoft.com/office/drawing/2014/main" id="{E3D07488-4BFA-402C-A0DB-3DFA545A3B90}"/>
+                </a:ext>
+              </a:extLst>
+            </p:cNvPr>
+            <p:cNvPicPr>
+              <a:picLocks noChangeAspect="1"/>
+            </p:cNvPicPr>
+            <p:nvPr/>
+          </p:nvPicPr>
+          <p:blipFill>
+            <a:blip r:embed="rId2" cstate="print">
+              <a:extLst>
+                <a:ext uri="{28A0092B-C50C-407E-A947-70E740481C1C}">
+                  <a14:useLocalDpi xmlns:a14="http://schemas.microsoft.com/office/drawing/2010/main" val="0"/>
+                </a:ext>
+                <a:ext uri="{96DAC541-7B7A-43D3-8B79-37D633B846F1}">
+                  <asvg:svgBlip xmlns:asvg="http://schemas.microsoft.com/office/drawing/2016/SVG/main" r:embed="rId3"/>
+                </a:ext>
+              </a:extLst>
+            </a:blip>
+            <a:stretch>
+              <a:fillRect/>
+            </a:stretch>
+          </p:blipFill>
+          <p:spPr>
+            <a:xfrm>
+              <a:off x="6812727" y="3408697"/>
+              <a:ext cx="2880000" cy="1241379"/>
+            </a:xfrm>
+            <a:prstGeom prst="rect">
+              <a:avLst/>
+            </a:prstGeom>
+          </p:spPr>
+        </p:pic>
+      </p:grpSp>
+      <p:grpSp>
+        <p:nvGrpSpPr>
+          <p:cNvPr id="15" name="Group 14">
+            <a:extLst>
+              <a:ext uri="{FF2B5EF4-FFF2-40B4-BE49-F238E27FC236}">
+                <a16:creationId xmlns:a16="http://schemas.microsoft.com/office/drawing/2014/main" id="{9206A932-3989-415B-9B42-DE5AA51210B3}"/>
+              </a:ext>
+            </a:extLst>
+          </p:cNvPr>
+          <p:cNvGrpSpPr/>
+          <p:nvPr/>
+        </p:nvGrpSpPr>
+        <p:grpSpPr>
+          <a:xfrm>
+            <a:off x="6812727" y="1844276"/>
+            <a:ext cx="2880000" cy="1242000"/>
+            <a:chOff x="6812727" y="1973672"/>
+            <a:chExt cx="2880000" cy="1242000"/>
+          </a:xfrm>
+        </p:grpSpPr>
+        <p:sp>
+          <p:nvSpPr>
+            <p:cNvPr id="12" name="Rectangle 11">
+              <a:extLst>
+                <a:ext uri="{FF2B5EF4-FFF2-40B4-BE49-F238E27FC236}">
+                  <a16:creationId xmlns:a16="http://schemas.microsoft.com/office/drawing/2014/main" id="{BE48D969-BA1C-4222-82FA-A0FC3886A246}"/>
+                </a:ext>
+              </a:extLst>
+            </p:cNvPr>
+            <p:cNvSpPr/>
+            <p:nvPr/>
+          </p:nvSpPr>
+          <p:spPr>
+            <a:xfrm>
+              <a:off x="6812727" y="1973672"/>
+              <a:ext cx="2880000" cy="1242000"/>
+            </a:xfrm>
+            <a:prstGeom prst="rect">
+              <a:avLst/>
+            </a:prstGeom>
+            <a:solidFill>
+              <a:schemeClr val="accent1">
+                <a:lumMod val="20000"/>
+                <a:lumOff val="80000"/>
+              </a:schemeClr>
+            </a:solidFill>
+            <a:ln>
+              <a:noFill/>
+            </a:ln>
+          </p:spPr>
+          <p:style>
+            <a:lnRef idx="2">
+              <a:schemeClr val="accent3">
+                <a:shade val="50000"/>
+              </a:schemeClr>
+            </a:lnRef>
+            <a:fillRef idx="1">
+              <a:schemeClr val="accent3"/>
+            </a:fillRef>
+            <a:effectRef idx="0">
+              <a:schemeClr val="accent3"/>
+            </a:effectRef>
+            <a:fontRef idx="minor">
+              <a:schemeClr val="lt1"/>
+            </a:fontRef>
+          </p:style>
+          <p:txBody>
+            <a:bodyPr rtlCol="0" anchor="ctr"/>
+            <a:lstStyle/>
+            <a:p>
+              <a:pPr algn="ctr"/>
+              <a:endParaRPr lang="en-US"/>
+            </a:p>
+          </p:txBody>
+        </p:sp>
+        <p:pic>
+          <p:nvPicPr>
+            <p:cNvPr id="13" name="Graphic 12">
+              <a:extLst>
+                <a:ext uri="{FF2B5EF4-FFF2-40B4-BE49-F238E27FC236}">
+                  <a16:creationId xmlns:a16="http://schemas.microsoft.com/office/drawing/2014/main" id="{286B6282-E557-41B5-89F0-C4BC3A20D184}"/>
+                </a:ext>
+              </a:extLst>
+            </p:cNvPr>
+            <p:cNvPicPr>
+              <a:picLocks noChangeAspect="1"/>
+            </p:cNvPicPr>
+            <p:nvPr/>
+          </p:nvPicPr>
+          <p:blipFill>
+            <a:blip r:embed="rId4" cstate="print">
+              <a:extLst>
+                <a:ext uri="{28A0092B-C50C-407E-A947-70E740481C1C}">
+                  <a14:useLocalDpi xmlns:a14="http://schemas.microsoft.com/office/drawing/2010/main" val="0"/>
+                </a:ext>
+                <a:ext uri="{96DAC541-7B7A-43D3-8B79-37D633B846F1}">
+                  <asvg:svgBlip xmlns:asvg="http://schemas.microsoft.com/office/drawing/2016/SVG/main" r:embed="rId5"/>
+                </a:ext>
+              </a:extLst>
+            </a:blip>
+            <a:srcRect/>
+            <a:stretch/>
+          </p:blipFill>
+          <p:spPr>
+            <a:xfrm>
+              <a:off x="6812727" y="1973672"/>
+              <a:ext cx="2879999" cy="1241379"/>
+            </a:xfrm>
+            <a:prstGeom prst="rect">
+              <a:avLst/>
+            </a:prstGeom>
+          </p:spPr>
+        </p:pic>
+      </p:grpSp>
     </p:spTree>
     <p:extLst>
       <p:ext uri="{BB962C8B-B14F-4D97-AF65-F5344CB8AC3E}">
@@ -4661,122 +5062,6 @@
       </p:grpSpPr>
       <p:sp>
         <p:nvSpPr>
-          <p:cNvPr id="2" name="Title 1">
-            <a:extLst>
-              <a:ext uri="{FF2B5EF4-FFF2-40B4-BE49-F238E27FC236}">
-                <a16:creationId xmlns:a16="http://schemas.microsoft.com/office/drawing/2014/main" id="{552A41D2-B180-436D-BB7B-7969DA62054B}"/>
-              </a:ext>
-            </a:extLst>
-          </p:cNvPr>
-          <p:cNvSpPr>
-            <a:spLocks noGrp="1"/>
-          </p:cNvSpPr>
-          <p:nvPr>
-            <p:ph type="title"/>
-          </p:nvPr>
-        </p:nvSpPr>
-        <p:spPr/>
-        <p:txBody>
-          <a:bodyPr/>
-          <a:lstStyle/>
-          <a:p>
-            <a:r>
-              <a:rPr lang="en-US" dirty="0"/>
-              <a:t>ICON DRAW RULES</a:t>
-            </a:r>
-          </a:p>
-        </p:txBody>
-      </p:sp>
-      <p:sp>
-        <p:nvSpPr>
-          <p:cNvPr id="11" name="Text Placeholder 10">
-            <a:extLst>
-              <a:ext uri="{FF2B5EF4-FFF2-40B4-BE49-F238E27FC236}">
-                <a16:creationId xmlns:a16="http://schemas.microsoft.com/office/drawing/2014/main" id="{ADE4E85D-DB5D-4B3E-8BC3-62487EDE031E}"/>
-              </a:ext>
-            </a:extLst>
-          </p:cNvPr>
-          <p:cNvSpPr>
-            <a:spLocks noGrp="1"/>
-          </p:cNvSpPr>
-          <p:nvPr>
-            <p:ph type="body" sz="half" idx="2"/>
-          </p:nvPr>
-        </p:nvSpPr>
-        <p:spPr/>
-        <p:txBody>
-          <a:bodyPr/>
-          <a:lstStyle/>
-          <a:p>
-            <a:endParaRPr lang="en-US"/>
-          </a:p>
-        </p:txBody>
-      </p:sp>
-      <p:sp>
-        <p:nvSpPr>
-          <p:cNvPr id="4" name="Slide Number Placeholder 3">
-            <a:extLst>
-              <a:ext uri="{FF2B5EF4-FFF2-40B4-BE49-F238E27FC236}">
-                <a16:creationId xmlns:a16="http://schemas.microsoft.com/office/drawing/2014/main" id="{C8D36FD0-7C5C-48B8-9481-43EC7E9C9197}"/>
-              </a:ext>
-            </a:extLst>
-          </p:cNvPr>
-          <p:cNvSpPr>
-            <a:spLocks noGrp="1"/>
-          </p:cNvSpPr>
-          <p:nvPr>
-            <p:ph type="sldNum" sz="quarter" idx="12"/>
-          </p:nvPr>
-        </p:nvSpPr>
-        <p:spPr/>
-        <p:txBody>
-          <a:bodyPr/>
-          <a:lstStyle/>
-          <a:p>
-            <a:fld id="{6B8230D4-A52F-48C3-88BB-7CF0A26BA1C5}" type="slidenum">
-              <a:rPr lang="en-US" smtClean="0"/>
-              <a:pPr/>
-              <a:t>12</a:t>
-            </a:fld>
-            <a:endParaRPr lang="en-US"/>
-          </a:p>
-        </p:txBody>
-      </p:sp>
-    </p:spTree>
-    <p:extLst>
-      <p:ext uri="{BB962C8B-B14F-4D97-AF65-F5344CB8AC3E}">
-        <p14:creationId xmlns:p14="http://schemas.microsoft.com/office/powerpoint/2010/main" val="902224127"/>
-      </p:ext>
-    </p:extLst>
-  </p:cSld>
-  <p:clrMapOvr>
-    <a:masterClrMapping/>
-  </p:clrMapOvr>
-  <p:transition spd="slow">
-    <p:push/>
-  </p:transition>
-</p:sld>
-</file>
-
-<file path=ppt/slides/slide13.xml><?xml version="1.0" encoding="utf-8"?>
-<p:sld xmlns:a="http://schemas.openxmlformats.org/drawingml/2006/main" xmlns:r="http://schemas.openxmlformats.org/officeDocument/2006/relationships" xmlns:p="http://schemas.openxmlformats.org/presentationml/2006/main">
-  <p:cSld>
-    <p:spTree>
-      <p:nvGrpSpPr>
-        <p:cNvPr id="1" name=""/>
-        <p:cNvGrpSpPr/>
-        <p:nvPr/>
-      </p:nvGrpSpPr>
-      <p:grpSpPr>
-        <a:xfrm>
-          <a:off x="0" y="0"/>
-          <a:ext cx="0" cy="0"/>
-          <a:chOff x="0" y="0"/>
-          <a:chExt cx="0" cy="0"/>
-        </a:xfrm>
-      </p:grpSpPr>
-      <p:sp>
-        <p:nvSpPr>
           <p:cNvPr id="2" name="Title 1"/>
           <p:cNvSpPr>
             <a:spLocks noGrp="1"/>
@@ -4866,7 +5151,7 @@
           <a:p>
             <a:fld id="{6B8230D4-A52F-48C3-88BB-7CF0A26BA1C5}" type="slidenum">
               <a:rPr lang="en-US" smtClean="0"/>
-              <a:t>13</a:t>
+              <a:t>12</a:t>
             </a:fld>
             <a:endParaRPr lang="en-US"/>
           </a:p>
@@ -4935,7 +5220,7 @@
               <a:buNone/>
             </a:pPr>
             <a:r>
-              <a:rPr lang="en-US" dirty="0" err="1"/>
+              <a:rPr lang="en-US" dirty="0"/>
               <a:t>abcdefghijklmnopqrstuvwxyz</a:t>
             </a:r>
             <a:endParaRPr lang="fa-IR" dirty="0"/>
@@ -4985,6 +5270,48 @@
   <p:transition spd="slow">
     <p:push dir="u"/>
   </p:transition>
+</p:sld>
+</file>
+
+<file path=ppt/slides/slide13.xml><?xml version="1.0" encoding="utf-8"?>
+<p:sld xmlns:a="http://schemas.openxmlformats.org/drawingml/2006/main" xmlns:r="http://schemas.openxmlformats.org/officeDocument/2006/relationships" xmlns:p="http://schemas.openxmlformats.org/presentationml/2006/main">
+  <p:cSld>
+    <p:spTree>
+      <p:nvGrpSpPr>
+        <p:cNvPr id="1" name=""/>
+        <p:cNvGrpSpPr/>
+        <p:nvPr/>
+      </p:nvGrpSpPr>
+      <p:grpSpPr>
+        <a:xfrm>
+          <a:off x="0" y="0"/>
+          <a:ext cx="0" cy="0"/>
+          <a:chOff x="0" y="0"/>
+          <a:chExt cx="0" cy="0"/>
+        </a:xfrm>
+      </p:grpSpPr>
+    </p:spTree>
+    <p:extLst>
+      <p:ext uri="{BB962C8B-B14F-4D97-AF65-F5344CB8AC3E}">
+        <p14:creationId xmlns:p14="http://schemas.microsoft.com/office/powerpoint/2010/main" val="1132238988"/>
+      </p:ext>
+    </p:extLst>
+  </p:cSld>
+  <p:clrMapOvr>
+    <a:masterClrMapping/>
+  </p:clrMapOvr>
+  <mc:AlternateContent xmlns:mc="http://schemas.openxmlformats.org/markup-compatibility/2006">
+    <mc:Choice xmlns:p14="http://schemas.microsoft.com/office/powerpoint/2010/main" Requires="p14">
+      <p:transition spd="slow" p14:dur="1600">
+        <p:blinds dir="vert"/>
+      </p:transition>
+    </mc:Choice>
+    <mc:Fallback>
+      <p:transition spd="slow">
+        <p:blinds dir="vert"/>
+      </p:transition>
+    </mc:Fallback>
+  </mc:AlternateContent>
 </p:sld>
 </file>
 
@@ -6080,36 +6407,1317 @@
           </a:p>
         </p:txBody>
       </p:sp>
-      <p:pic>
-        <p:nvPicPr>
-          <p:cNvPr id="4" name="Picture 3">
+      <p:grpSp>
+        <p:nvGrpSpPr>
+          <p:cNvPr id="19" name="Group 18">
             <a:extLst>
               <a:ext uri="{FF2B5EF4-FFF2-40B4-BE49-F238E27FC236}">
-                <a16:creationId xmlns:a16="http://schemas.microsoft.com/office/drawing/2014/main" id="{DC75354A-4C93-41D5-B2AF-E0D8497AE188}"/>
+                <a16:creationId xmlns:a16="http://schemas.microsoft.com/office/drawing/2014/main" id="{1A9585FA-DEF3-40DB-91E8-4315562D3E03}"/>
               </a:ext>
             </a:extLst>
           </p:cNvPr>
-          <p:cNvPicPr>
-            <a:picLocks noChangeAspect="1"/>
-          </p:cNvPicPr>
+          <p:cNvGrpSpPr/>
           <p:nvPr/>
-        </p:nvPicPr>
-        <p:blipFill>
-          <a:blip r:embed="rId2"/>
-          <a:stretch>
-            <a:fillRect/>
-          </a:stretch>
-        </p:blipFill>
-        <p:spPr>
+        </p:nvGrpSpPr>
+        <p:grpSpPr>
           <a:xfrm>
-            <a:off x="5778085" y="1206687"/>
-            <a:ext cx="5087060" cy="4582164"/>
+            <a:off x="6137276" y="3277962"/>
+            <a:ext cx="1192338" cy="720000"/>
+            <a:chOff x="7914499" y="1512000"/>
+            <a:chExt cx="1192338" cy="720000"/>
           </a:xfrm>
-          <a:prstGeom prst="rect">
-            <a:avLst/>
-          </a:prstGeom>
-        </p:spPr>
-      </p:pic>
+        </p:grpSpPr>
+        <p:pic>
+          <p:nvPicPr>
+            <p:cNvPr id="11" name="Graphic 10">
+              <a:extLst>
+                <a:ext uri="{FF2B5EF4-FFF2-40B4-BE49-F238E27FC236}">
+                  <a16:creationId xmlns:a16="http://schemas.microsoft.com/office/drawing/2014/main" id="{034B8A1F-1C29-4ED9-A9FA-72BE10294CE8}"/>
+                </a:ext>
+              </a:extLst>
+            </p:cNvPr>
+            <p:cNvPicPr>
+              <a:picLocks noChangeAspect="1"/>
+            </p:cNvPicPr>
+            <p:nvPr/>
+          </p:nvPicPr>
+          <p:blipFill>
+            <a:blip r:embed="rId2" cstate="print">
+              <a:extLst>
+                <a:ext uri="{28A0092B-C50C-407E-A947-70E740481C1C}">
+                  <a14:useLocalDpi xmlns:a14="http://schemas.microsoft.com/office/drawing/2010/main" val="0"/>
+                </a:ext>
+                <a:ext uri="{96DAC541-7B7A-43D3-8B79-37D633B846F1}">
+                  <asvg:svgBlip xmlns:asvg="http://schemas.microsoft.com/office/drawing/2016/SVG/main" r:embed="rId3"/>
+                </a:ext>
+              </a:extLst>
+            </a:blip>
+            <a:srcRect/>
+            <a:stretch/>
+          </p:blipFill>
+          <p:spPr>
+            <a:xfrm>
+              <a:off x="8148064" y="1512000"/>
+              <a:ext cx="720000" cy="720000"/>
+            </a:xfrm>
+            <a:prstGeom prst="rect">
+              <a:avLst/>
+            </a:prstGeom>
+          </p:spPr>
+        </p:pic>
+        <p:cxnSp>
+          <p:nvCxnSpPr>
+            <p:cNvPr id="12" name="Straight Arrow Connector 11">
+              <a:extLst>
+                <a:ext uri="{FF2B5EF4-FFF2-40B4-BE49-F238E27FC236}">
+                  <a16:creationId xmlns:a16="http://schemas.microsoft.com/office/drawing/2014/main" id="{FBE1C4DA-69FC-4372-8A67-D38072BBCF2E}"/>
+                </a:ext>
+              </a:extLst>
+            </p:cNvPr>
+            <p:cNvCxnSpPr>
+              <a:cxnSpLocks/>
+            </p:cNvCxnSpPr>
+            <p:nvPr/>
+          </p:nvCxnSpPr>
+          <p:spPr>
+            <a:xfrm>
+              <a:off x="7914499" y="1512000"/>
+              <a:ext cx="1192338" cy="0"/>
+            </a:xfrm>
+            <a:prstGeom prst="straightConnector1">
+              <a:avLst/>
+            </a:prstGeom>
+            <a:ln cap="rnd">
+              <a:solidFill>
+                <a:schemeClr val="accent1">
+                  <a:lumMod val="60000"/>
+                  <a:lumOff val="40000"/>
+                </a:schemeClr>
+              </a:solidFill>
+              <a:round/>
+              <a:headEnd type="none" w="sm" len="sm"/>
+              <a:tailEnd type="none" w="sm" len="sm"/>
+            </a:ln>
+          </p:spPr>
+          <p:style>
+            <a:lnRef idx="1">
+              <a:schemeClr val="accent1"/>
+            </a:lnRef>
+            <a:fillRef idx="0">
+              <a:schemeClr val="accent1"/>
+            </a:fillRef>
+            <a:effectRef idx="0">
+              <a:schemeClr val="accent1"/>
+            </a:effectRef>
+            <a:fontRef idx="minor">
+              <a:schemeClr val="tx1"/>
+            </a:fontRef>
+          </p:style>
+        </p:cxnSp>
+        <p:cxnSp>
+          <p:nvCxnSpPr>
+            <p:cNvPr id="14" name="Straight Arrow Connector 13">
+              <a:extLst>
+                <a:ext uri="{FF2B5EF4-FFF2-40B4-BE49-F238E27FC236}">
+                  <a16:creationId xmlns:a16="http://schemas.microsoft.com/office/drawing/2014/main" id="{E4E1A884-946D-47A4-979D-4D36B0DDB989}"/>
+                </a:ext>
+              </a:extLst>
+            </p:cNvPr>
+            <p:cNvCxnSpPr>
+              <a:cxnSpLocks/>
+            </p:cNvCxnSpPr>
+            <p:nvPr/>
+          </p:nvCxnSpPr>
+          <p:spPr>
+            <a:xfrm>
+              <a:off x="7914499" y="2232000"/>
+              <a:ext cx="1192338" cy="0"/>
+            </a:xfrm>
+            <a:prstGeom prst="straightConnector1">
+              <a:avLst/>
+            </a:prstGeom>
+            <a:ln cap="rnd">
+              <a:solidFill>
+                <a:schemeClr val="accent1">
+                  <a:lumMod val="60000"/>
+                  <a:lumOff val="40000"/>
+                </a:schemeClr>
+              </a:solidFill>
+              <a:round/>
+              <a:headEnd type="none" w="sm" len="sm"/>
+              <a:tailEnd type="none" w="sm" len="sm"/>
+            </a:ln>
+          </p:spPr>
+          <p:style>
+            <a:lnRef idx="1">
+              <a:schemeClr val="accent1"/>
+            </a:lnRef>
+            <a:fillRef idx="0">
+              <a:schemeClr val="accent1"/>
+            </a:fillRef>
+            <a:effectRef idx="0">
+              <a:schemeClr val="accent1"/>
+            </a:effectRef>
+            <a:fontRef idx="minor">
+              <a:schemeClr val="tx1"/>
+            </a:fontRef>
+          </p:style>
+        </p:cxnSp>
+        <p:cxnSp>
+          <p:nvCxnSpPr>
+            <p:cNvPr id="15" name="Straight Arrow Connector 14">
+              <a:extLst>
+                <a:ext uri="{FF2B5EF4-FFF2-40B4-BE49-F238E27FC236}">
+                  <a16:creationId xmlns:a16="http://schemas.microsoft.com/office/drawing/2014/main" id="{18A5F135-F947-4AAE-8B58-9E3F69B8E47D}"/>
+                </a:ext>
+              </a:extLst>
+            </p:cNvPr>
+            <p:cNvCxnSpPr>
+              <a:cxnSpLocks/>
+            </p:cNvCxnSpPr>
+            <p:nvPr/>
+          </p:nvCxnSpPr>
+          <p:spPr>
+            <a:xfrm>
+              <a:off x="7914499" y="1992000"/>
+              <a:ext cx="1192338" cy="0"/>
+            </a:xfrm>
+            <a:prstGeom prst="straightConnector1">
+              <a:avLst/>
+            </a:prstGeom>
+            <a:ln cap="rnd">
+              <a:solidFill>
+                <a:schemeClr val="accent1">
+                  <a:lumMod val="60000"/>
+                  <a:lumOff val="40000"/>
+                </a:schemeClr>
+              </a:solidFill>
+              <a:round/>
+              <a:headEnd type="none" w="sm" len="sm"/>
+              <a:tailEnd type="none" w="sm" len="sm"/>
+            </a:ln>
+          </p:spPr>
+          <p:style>
+            <a:lnRef idx="1">
+              <a:schemeClr val="accent1"/>
+            </a:lnRef>
+            <a:fillRef idx="0">
+              <a:schemeClr val="accent1"/>
+            </a:fillRef>
+            <a:effectRef idx="0">
+              <a:schemeClr val="accent1"/>
+            </a:effectRef>
+            <a:fontRef idx="minor">
+              <a:schemeClr val="tx1"/>
+            </a:fontRef>
+          </p:style>
+        </p:cxnSp>
+        <p:cxnSp>
+          <p:nvCxnSpPr>
+            <p:cNvPr id="16" name="Straight Arrow Connector 15">
+              <a:extLst>
+                <a:ext uri="{FF2B5EF4-FFF2-40B4-BE49-F238E27FC236}">
+                  <a16:creationId xmlns:a16="http://schemas.microsoft.com/office/drawing/2014/main" id="{4F9CD472-7590-41F4-B8C0-741873A2988A}"/>
+                </a:ext>
+              </a:extLst>
+            </p:cNvPr>
+            <p:cNvCxnSpPr>
+              <a:cxnSpLocks/>
+            </p:cNvCxnSpPr>
+            <p:nvPr/>
+          </p:nvCxnSpPr>
+          <p:spPr>
+            <a:xfrm>
+              <a:off x="7914499" y="1752000"/>
+              <a:ext cx="1192338" cy="0"/>
+            </a:xfrm>
+            <a:prstGeom prst="straightConnector1">
+              <a:avLst/>
+            </a:prstGeom>
+            <a:ln cap="rnd">
+              <a:solidFill>
+                <a:schemeClr val="accent1">
+                  <a:lumMod val="60000"/>
+                  <a:lumOff val="40000"/>
+                </a:schemeClr>
+              </a:solidFill>
+              <a:round/>
+              <a:headEnd type="none" w="sm" len="sm"/>
+              <a:tailEnd type="none" w="sm" len="sm"/>
+            </a:ln>
+          </p:spPr>
+          <p:style>
+            <a:lnRef idx="1">
+              <a:schemeClr val="accent1"/>
+            </a:lnRef>
+            <a:fillRef idx="0">
+              <a:schemeClr val="accent1"/>
+            </a:fillRef>
+            <a:effectRef idx="0">
+              <a:schemeClr val="accent1"/>
+            </a:effectRef>
+            <a:fontRef idx="minor">
+              <a:schemeClr val="tx1"/>
+            </a:fontRef>
+          </p:style>
+        </p:cxnSp>
+        <p:sp>
+          <p:nvSpPr>
+            <p:cNvPr id="17" name="Rectangle 16">
+              <a:extLst>
+                <a:ext uri="{FF2B5EF4-FFF2-40B4-BE49-F238E27FC236}">
+                  <a16:creationId xmlns:a16="http://schemas.microsoft.com/office/drawing/2014/main" id="{E9E58B7A-43AC-4F80-9645-5D67DA08312E}"/>
+                </a:ext>
+              </a:extLst>
+            </p:cNvPr>
+            <p:cNvSpPr/>
+            <p:nvPr/>
+          </p:nvSpPr>
+          <p:spPr>
+            <a:xfrm>
+              <a:off x="7914499" y="1512000"/>
+              <a:ext cx="1192338" cy="239994"/>
+            </a:xfrm>
+            <a:prstGeom prst="rect">
+              <a:avLst/>
+            </a:prstGeom>
+            <a:solidFill>
+              <a:schemeClr val="accent1">
+                <a:lumMod val="20000"/>
+                <a:lumOff val="80000"/>
+                <a:alpha val="60000"/>
+              </a:schemeClr>
+            </a:solidFill>
+            <a:ln>
+              <a:noFill/>
+            </a:ln>
+          </p:spPr>
+          <p:style>
+            <a:lnRef idx="2">
+              <a:schemeClr val="accent1">
+                <a:shade val="50000"/>
+              </a:schemeClr>
+            </a:lnRef>
+            <a:fillRef idx="1">
+              <a:schemeClr val="accent1"/>
+            </a:fillRef>
+            <a:effectRef idx="0">
+              <a:schemeClr val="accent1"/>
+            </a:effectRef>
+            <a:fontRef idx="minor">
+              <a:schemeClr val="lt1"/>
+            </a:fontRef>
+          </p:style>
+          <p:txBody>
+            <a:bodyPr rtlCol="0" anchor="ctr"/>
+            <a:lstStyle/>
+            <a:p>
+              <a:r>
+                <a:rPr lang="en-US" sz="1100" dirty="0">
+                  <a:solidFill>
+                    <a:schemeClr val="accent5"/>
+                  </a:solidFill>
+                </a:rPr>
+                <a:t>x</a:t>
+              </a:r>
+            </a:p>
+          </p:txBody>
+        </p:sp>
+      </p:grpSp>
+      <p:grpSp>
+        <p:nvGrpSpPr>
+          <p:cNvPr id="30" name="Group 29">
+            <a:extLst>
+              <a:ext uri="{FF2B5EF4-FFF2-40B4-BE49-F238E27FC236}">
+                <a16:creationId xmlns:a16="http://schemas.microsoft.com/office/drawing/2014/main" id="{8BB23AB5-FBA1-4B40-8602-3DE2F09D7C72}"/>
+              </a:ext>
+            </a:extLst>
+          </p:cNvPr>
+          <p:cNvGrpSpPr/>
+          <p:nvPr/>
+        </p:nvGrpSpPr>
+        <p:grpSpPr>
+          <a:xfrm>
+            <a:off x="6137276" y="1697786"/>
+            <a:ext cx="1224000" cy="1224000"/>
+            <a:chOff x="7569995" y="2081902"/>
+            <a:chExt cx="1224000" cy="1224000"/>
+          </a:xfrm>
+        </p:grpSpPr>
+        <p:pic>
+          <p:nvPicPr>
+            <p:cNvPr id="21" name="Graphic 20">
+              <a:extLst>
+                <a:ext uri="{FF2B5EF4-FFF2-40B4-BE49-F238E27FC236}">
+                  <a16:creationId xmlns:a16="http://schemas.microsoft.com/office/drawing/2014/main" id="{E9A84D8E-6166-4DEE-8C73-BC7260F9C12E}"/>
+                </a:ext>
+              </a:extLst>
+            </p:cNvPr>
+            <p:cNvPicPr>
+              <a:picLocks noChangeAspect="1"/>
+            </p:cNvPicPr>
+            <p:nvPr/>
+          </p:nvPicPr>
+          <p:blipFill>
+            <a:blip r:embed="rId2" cstate="print">
+              <a:extLst>
+                <a:ext uri="{28A0092B-C50C-407E-A947-70E740481C1C}">
+                  <a14:useLocalDpi xmlns:a14="http://schemas.microsoft.com/office/drawing/2010/main" val="0"/>
+                </a:ext>
+                <a:ext uri="{96DAC541-7B7A-43D3-8B79-37D633B846F1}">
+                  <asvg:svgBlip xmlns:asvg="http://schemas.microsoft.com/office/drawing/2016/SVG/main" r:embed="rId3"/>
+                </a:ext>
+              </a:extLst>
+            </a:blip>
+            <a:srcRect/>
+            <a:stretch/>
+          </p:blipFill>
+          <p:spPr>
+            <a:xfrm>
+              <a:off x="7822515" y="2332361"/>
+              <a:ext cx="720000" cy="720000"/>
+            </a:xfrm>
+            <a:prstGeom prst="rect">
+              <a:avLst/>
+            </a:prstGeom>
+          </p:spPr>
+        </p:pic>
+        <p:cxnSp>
+          <p:nvCxnSpPr>
+            <p:cNvPr id="22" name="Straight Arrow Connector 21">
+              <a:extLst>
+                <a:ext uri="{FF2B5EF4-FFF2-40B4-BE49-F238E27FC236}">
+                  <a16:creationId xmlns:a16="http://schemas.microsoft.com/office/drawing/2014/main" id="{B3771ACA-F452-4538-8D34-FE7A9FBDA26A}"/>
+                </a:ext>
+              </a:extLst>
+            </p:cNvPr>
+            <p:cNvCxnSpPr>
+              <a:cxnSpLocks/>
+            </p:cNvCxnSpPr>
+            <p:nvPr/>
+          </p:nvCxnSpPr>
+          <p:spPr>
+            <a:xfrm>
+              <a:off x="7584187" y="2318072"/>
+              <a:ext cx="1192338" cy="0"/>
+            </a:xfrm>
+            <a:prstGeom prst="straightConnector1">
+              <a:avLst/>
+            </a:prstGeom>
+            <a:ln cap="rnd">
+              <a:solidFill>
+                <a:schemeClr val="accent1">
+                  <a:lumMod val="60000"/>
+                  <a:lumOff val="40000"/>
+                </a:schemeClr>
+              </a:solidFill>
+              <a:round/>
+              <a:headEnd type="none" w="sm" len="sm"/>
+              <a:tailEnd type="none" w="sm" len="sm"/>
+            </a:ln>
+          </p:spPr>
+          <p:style>
+            <a:lnRef idx="1">
+              <a:schemeClr val="accent1"/>
+            </a:lnRef>
+            <a:fillRef idx="0">
+              <a:schemeClr val="accent1"/>
+            </a:fillRef>
+            <a:effectRef idx="0">
+              <a:schemeClr val="accent1"/>
+            </a:effectRef>
+            <a:fontRef idx="minor">
+              <a:schemeClr val="tx1"/>
+            </a:fontRef>
+          </p:style>
+        </p:cxnSp>
+        <p:cxnSp>
+          <p:nvCxnSpPr>
+            <p:cNvPr id="23" name="Straight Arrow Connector 22">
+              <a:extLst>
+                <a:ext uri="{FF2B5EF4-FFF2-40B4-BE49-F238E27FC236}">
+                  <a16:creationId xmlns:a16="http://schemas.microsoft.com/office/drawing/2014/main" id="{49BFC356-B04D-4582-BEF2-D7CB4DDB61FD}"/>
+                </a:ext>
+              </a:extLst>
+            </p:cNvPr>
+            <p:cNvCxnSpPr>
+              <a:cxnSpLocks/>
+            </p:cNvCxnSpPr>
+            <p:nvPr/>
+          </p:nvCxnSpPr>
+          <p:spPr>
+            <a:xfrm>
+              <a:off x="7584187" y="3038072"/>
+              <a:ext cx="1192338" cy="0"/>
+            </a:xfrm>
+            <a:prstGeom prst="straightConnector1">
+              <a:avLst/>
+            </a:prstGeom>
+            <a:ln cap="rnd">
+              <a:solidFill>
+                <a:schemeClr val="accent1">
+                  <a:lumMod val="60000"/>
+                  <a:lumOff val="40000"/>
+                </a:schemeClr>
+              </a:solidFill>
+              <a:round/>
+              <a:headEnd type="none" w="sm" len="sm"/>
+              <a:tailEnd type="none" w="sm" len="sm"/>
+            </a:ln>
+          </p:spPr>
+          <p:style>
+            <a:lnRef idx="1">
+              <a:schemeClr val="accent1"/>
+            </a:lnRef>
+            <a:fillRef idx="0">
+              <a:schemeClr val="accent1"/>
+            </a:fillRef>
+            <a:effectRef idx="0">
+              <a:schemeClr val="accent1"/>
+            </a:effectRef>
+            <a:fontRef idx="minor">
+              <a:schemeClr val="tx1"/>
+            </a:fontRef>
+          </p:style>
+        </p:cxnSp>
+        <p:sp>
+          <p:nvSpPr>
+            <p:cNvPr id="26" name="Rectangle 25">
+              <a:extLst>
+                <a:ext uri="{FF2B5EF4-FFF2-40B4-BE49-F238E27FC236}">
+                  <a16:creationId xmlns:a16="http://schemas.microsoft.com/office/drawing/2014/main" id="{6D78268C-5026-4B78-888F-04E655DCFED9}"/>
+                </a:ext>
+              </a:extLst>
+            </p:cNvPr>
+            <p:cNvSpPr/>
+            <p:nvPr/>
+          </p:nvSpPr>
+          <p:spPr>
+            <a:xfrm>
+              <a:off x="7569995" y="2081902"/>
+              <a:ext cx="1224000" cy="239994"/>
+            </a:xfrm>
+            <a:prstGeom prst="rect">
+              <a:avLst/>
+            </a:prstGeom>
+            <a:solidFill>
+              <a:schemeClr val="accent1">
+                <a:lumMod val="20000"/>
+                <a:lumOff val="80000"/>
+                <a:alpha val="60000"/>
+              </a:schemeClr>
+            </a:solidFill>
+            <a:ln>
+              <a:noFill/>
+            </a:ln>
+          </p:spPr>
+          <p:style>
+            <a:lnRef idx="2">
+              <a:schemeClr val="accent1">
+                <a:shade val="50000"/>
+              </a:schemeClr>
+            </a:lnRef>
+            <a:fillRef idx="1">
+              <a:schemeClr val="accent1"/>
+            </a:fillRef>
+            <a:effectRef idx="0">
+              <a:schemeClr val="accent1"/>
+            </a:effectRef>
+            <a:fontRef idx="minor">
+              <a:schemeClr val="lt1"/>
+            </a:fontRef>
+          </p:style>
+          <p:txBody>
+            <a:bodyPr rtlCol="0" anchor="ctr"/>
+            <a:lstStyle/>
+            <a:p>
+              <a:r>
+                <a:rPr lang="en-US" sz="1100" dirty="0">
+                  <a:solidFill>
+                    <a:schemeClr val="accent5"/>
+                  </a:solidFill>
+                </a:rPr>
+                <a:t>x</a:t>
+              </a:r>
+            </a:p>
+          </p:txBody>
+        </p:sp>
+        <p:sp>
+          <p:nvSpPr>
+            <p:cNvPr id="27" name="Rectangle 26">
+              <a:extLst>
+                <a:ext uri="{FF2B5EF4-FFF2-40B4-BE49-F238E27FC236}">
+                  <a16:creationId xmlns:a16="http://schemas.microsoft.com/office/drawing/2014/main" id="{F8F65D2E-0BE5-4A9C-A655-A6CB73F5B887}"/>
+                </a:ext>
+              </a:extLst>
+            </p:cNvPr>
+            <p:cNvSpPr/>
+            <p:nvPr/>
+          </p:nvSpPr>
+          <p:spPr>
+            <a:xfrm>
+              <a:off x="7569995" y="3065908"/>
+              <a:ext cx="1224000" cy="239994"/>
+            </a:xfrm>
+            <a:prstGeom prst="rect">
+              <a:avLst/>
+            </a:prstGeom>
+            <a:solidFill>
+              <a:schemeClr val="accent1">
+                <a:lumMod val="20000"/>
+                <a:lumOff val="80000"/>
+                <a:alpha val="60000"/>
+              </a:schemeClr>
+            </a:solidFill>
+            <a:ln>
+              <a:noFill/>
+            </a:ln>
+          </p:spPr>
+          <p:style>
+            <a:lnRef idx="2">
+              <a:schemeClr val="accent1">
+                <a:shade val="50000"/>
+              </a:schemeClr>
+            </a:lnRef>
+            <a:fillRef idx="1">
+              <a:schemeClr val="accent1"/>
+            </a:fillRef>
+            <a:effectRef idx="0">
+              <a:schemeClr val="accent1"/>
+            </a:effectRef>
+            <a:fontRef idx="minor">
+              <a:schemeClr val="lt1"/>
+            </a:fontRef>
+          </p:style>
+          <p:txBody>
+            <a:bodyPr rtlCol="0" anchor="ctr"/>
+            <a:lstStyle/>
+            <a:p>
+              <a:endParaRPr lang="en-US" sz="1100" dirty="0">
+                <a:solidFill>
+                  <a:schemeClr val="accent5"/>
+                </a:solidFill>
+              </a:endParaRPr>
+            </a:p>
+          </p:txBody>
+        </p:sp>
+        <p:sp>
+          <p:nvSpPr>
+            <p:cNvPr id="28" name="Rectangle 27">
+              <a:extLst>
+                <a:ext uri="{FF2B5EF4-FFF2-40B4-BE49-F238E27FC236}">
+                  <a16:creationId xmlns:a16="http://schemas.microsoft.com/office/drawing/2014/main" id="{C5BA278A-46B8-4466-8524-51C1B58C9153}"/>
+                </a:ext>
+              </a:extLst>
+            </p:cNvPr>
+            <p:cNvSpPr/>
+            <p:nvPr/>
+          </p:nvSpPr>
+          <p:spPr>
+            <a:xfrm rot="5400000">
+              <a:off x="8061998" y="2573905"/>
+              <a:ext cx="1224000" cy="239994"/>
+            </a:xfrm>
+            <a:prstGeom prst="rect">
+              <a:avLst/>
+            </a:prstGeom>
+            <a:solidFill>
+              <a:schemeClr val="accent1">
+                <a:lumMod val="20000"/>
+                <a:lumOff val="80000"/>
+                <a:alpha val="60000"/>
+              </a:schemeClr>
+            </a:solidFill>
+            <a:ln>
+              <a:noFill/>
+            </a:ln>
+          </p:spPr>
+          <p:style>
+            <a:lnRef idx="2">
+              <a:schemeClr val="accent1">
+                <a:shade val="50000"/>
+              </a:schemeClr>
+            </a:lnRef>
+            <a:fillRef idx="1">
+              <a:schemeClr val="accent1"/>
+            </a:fillRef>
+            <a:effectRef idx="0">
+              <a:schemeClr val="accent1"/>
+            </a:effectRef>
+            <a:fontRef idx="minor">
+              <a:schemeClr val="lt1"/>
+            </a:fontRef>
+          </p:style>
+          <p:txBody>
+            <a:bodyPr rtlCol="0" anchor="ctr"/>
+            <a:lstStyle/>
+            <a:p>
+              <a:endParaRPr lang="en-US" sz="1100" dirty="0">
+                <a:solidFill>
+                  <a:schemeClr val="accent5"/>
+                </a:solidFill>
+              </a:endParaRPr>
+            </a:p>
+          </p:txBody>
+        </p:sp>
+        <p:sp>
+          <p:nvSpPr>
+            <p:cNvPr id="29" name="Rectangle 28">
+              <a:extLst>
+                <a:ext uri="{FF2B5EF4-FFF2-40B4-BE49-F238E27FC236}">
+                  <a16:creationId xmlns:a16="http://schemas.microsoft.com/office/drawing/2014/main" id="{8EAC9AA3-7643-4490-A55D-A96D45B930AE}"/>
+                </a:ext>
+              </a:extLst>
+            </p:cNvPr>
+            <p:cNvSpPr/>
+            <p:nvPr/>
+          </p:nvSpPr>
+          <p:spPr>
+            <a:xfrm rot="5400000">
+              <a:off x="7077992" y="2573905"/>
+              <a:ext cx="1224000" cy="239994"/>
+            </a:xfrm>
+            <a:prstGeom prst="rect">
+              <a:avLst/>
+            </a:prstGeom>
+            <a:solidFill>
+              <a:schemeClr val="accent1">
+                <a:lumMod val="20000"/>
+                <a:lumOff val="80000"/>
+                <a:alpha val="60000"/>
+              </a:schemeClr>
+            </a:solidFill>
+            <a:ln>
+              <a:noFill/>
+            </a:ln>
+          </p:spPr>
+          <p:style>
+            <a:lnRef idx="2">
+              <a:schemeClr val="accent1">
+                <a:shade val="50000"/>
+              </a:schemeClr>
+            </a:lnRef>
+            <a:fillRef idx="1">
+              <a:schemeClr val="accent1"/>
+            </a:fillRef>
+            <a:effectRef idx="0">
+              <a:schemeClr val="accent1"/>
+            </a:effectRef>
+            <a:fontRef idx="minor">
+              <a:schemeClr val="lt1"/>
+            </a:fontRef>
+          </p:style>
+          <p:txBody>
+            <a:bodyPr rtlCol="0" anchor="ctr"/>
+            <a:lstStyle/>
+            <a:p>
+              <a:endParaRPr lang="en-US" sz="1100" dirty="0">
+                <a:solidFill>
+                  <a:schemeClr val="accent5"/>
+                </a:solidFill>
+              </a:endParaRPr>
+            </a:p>
+          </p:txBody>
+        </p:sp>
+      </p:grpSp>
+      <p:grpSp>
+        <p:nvGrpSpPr>
+          <p:cNvPr id="40" name="Group 39">
+            <a:extLst>
+              <a:ext uri="{FF2B5EF4-FFF2-40B4-BE49-F238E27FC236}">
+                <a16:creationId xmlns:a16="http://schemas.microsoft.com/office/drawing/2014/main" id="{28B5E9C6-E5C0-44A6-AE70-F506760FE9B4}"/>
+              </a:ext>
+            </a:extLst>
+          </p:cNvPr>
+          <p:cNvGrpSpPr/>
+          <p:nvPr/>
+        </p:nvGrpSpPr>
+        <p:grpSpPr>
+          <a:xfrm>
+            <a:off x="7726422" y="3276170"/>
+            <a:ext cx="1816940" cy="1728000"/>
+            <a:chOff x="8710866" y="2048564"/>
+            <a:chExt cx="1816940" cy="1728000"/>
+          </a:xfrm>
+        </p:grpSpPr>
+        <p:pic>
+          <p:nvPicPr>
+            <p:cNvPr id="34" name="Graphic 33">
+              <a:extLst>
+                <a:ext uri="{FF2B5EF4-FFF2-40B4-BE49-F238E27FC236}">
+                  <a16:creationId xmlns:a16="http://schemas.microsoft.com/office/drawing/2014/main" id="{6CE9C37B-1B09-41F3-AFDF-379FC32D225C}"/>
+                </a:ext>
+              </a:extLst>
+            </p:cNvPr>
+            <p:cNvPicPr>
+              <a:picLocks noChangeAspect="1"/>
+            </p:cNvPicPr>
+            <p:nvPr/>
+          </p:nvPicPr>
+          <p:blipFill>
+            <a:blip r:embed="rId4" cstate="print">
+              <a:extLst>
+                <a:ext uri="{28A0092B-C50C-407E-A947-70E740481C1C}">
+                  <a14:useLocalDpi xmlns:a14="http://schemas.microsoft.com/office/drawing/2010/main" val="0"/>
+                </a:ext>
+                <a:ext uri="{96DAC541-7B7A-43D3-8B79-37D633B846F1}">
+                  <asvg:svgBlip xmlns:asvg="http://schemas.microsoft.com/office/drawing/2016/SVG/main" r:embed="rId5"/>
+                </a:ext>
+              </a:extLst>
+            </a:blip>
+            <a:stretch>
+              <a:fillRect/>
+            </a:stretch>
+          </p:blipFill>
+          <p:spPr>
+            <a:xfrm>
+              <a:off x="8959503" y="2296729"/>
+              <a:ext cx="1318154" cy="1224000"/>
+            </a:xfrm>
+            <a:prstGeom prst="rect">
+              <a:avLst/>
+            </a:prstGeom>
+          </p:spPr>
+        </p:pic>
+        <p:sp>
+          <p:nvSpPr>
+            <p:cNvPr id="36" name="Rectangle 35">
+              <a:extLst>
+                <a:ext uri="{FF2B5EF4-FFF2-40B4-BE49-F238E27FC236}">
+                  <a16:creationId xmlns:a16="http://schemas.microsoft.com/office/drawing/2014/main" id="{5B65F7BA-3BA8-4C3C-83FC-0476DD04C6DE}"/>
+                </a:ext>
+              </a:extLst>
+            </p:cNvPr>
+            <p:cNvSpPr/>
+            <p:nvPr/>
+          </p:nvSpPr>
+          <p:spPr>
+            <a:xfrm>
+              <a:off x="8710867" y="2048564"/>
+              <a:ext cx="1816939" cy="239994"/>
+            </a:xfrm>
+            <a:prstGeom prst="rect">
+              <a:avLst/>
+            </a:prstGeom>
+            <a:solidFill>
+              <a:schemeClr val="accent1">
+                <a:lumMod val="20000"/>
+                <a:lumOff val="80000"/>
+                <a:alpha val="60000"/>
+              </a:schemeClr>
+            </a:solidFill>
+            <a:ln>
+              <a:noFill/>
+            </a:ln>
+          </p:spPr>
+          <p:style>
+            <a:lnRef idx="2">
+              <a:schemeClr val="accent1">
+                <a:shade val="50000"/>
+              </a:schemeClr>
+            </a:lnRef>
+            <a:fillRef idx="1">
+              <a:schemeClr val="accent1"/>
+            </a:fillRef>
+            <a:effectRef idx="0">
+              <a:schemeClr val="accent1"/>
+            </a:effectRef>
+            <a:fontRef idx="minor">
+              <a:schemeClr val="lt1"/>
+            </a:fontRef>
+          </p:style>
+          <p:txBody>
+            <a:bodyPr rtlCol="0" anchor="ctr"/>
+            <a:lstStyle/>
+            <a:p>
+              <a:r>
+                <a:rPr lang="en-US" sz="1100" dirty="0">
+                  <a:solidFill>
+                    <a:schemeClr val="accent5"/>
+                  </a:solidFill>
+                </a:rPr>
+                <a:t>x</a:t>
+              </a:r>
+            </a:p>
+          </p:txBody>
+        </p:sp>
+        <p:sp>
+          <p:nvSpPr>
+            <p:cNvPr id="37" name="Rectangle 36">
+              <a:extLst>
+                <a:ext uri="{FF2B5EF4-FFF2-40B4-BE49-F238E27FC236}">
+                  <a16:creationId xmlns:a16="http://schemas.microsoft.com/office/drawing/2014/main" id="{953A822D-0D24-438C-912B-0F07BE875015}"/>
+                </a:ext>
+              </a:extLst>
+            </p:cNvPr>
+            <p:cNvSpPr/>
+            <p:nvPr/>
+          </p:nvSpPr>
+          <p:spPr>
+            <a:xfrm>
+              <a:off x="8710867" y="3536570"/>
+              <a:ext cx="1816939" cy="239994"/>
+            </a:xfrm>
+            <a:prstGeom prst="rect">
+              <a:avLst/>
+            </a:prstGeom>
+            <a:solidFill>
+              <a:schemeClr val="accent1">
+                <a:lumMod val="20000"/>
+                <a:lumOff val="80000"/>
+                <a:alpha val="60000"/>
+              </a:schemeClr>
+            </a:solidFill>
+            <a:ln>
+              <a:noFill/>
+            </a:ln>
+          </p:spPr>
+          <p:style>
+            <a:lnRef idx="2">
+              <a:schemeClr val="accent1">
+                <a:shade val="50000"/>
+              </a:schemeClr>
+            </a:lnRef>
+            <a:fillRef idx="1">
+              <a:schemeClr val="accent1"/>
+            </a:fillRef>
+            <a:effectRef idx="0">
+              <a:schemeClr val="accent1"/>
+            </a:effectRef>
+            <a:fontRef idx="minor">
+              <a:schemeClr val="lt1"/>
+            </a:fontRef>
+          </p:style>
+          <p:txBody>
+            <a:bodyPr rtlCol="0" anchor="ctr"/>
+            <a:lstStyle/>
+            <a:p>
+              <a:endParaRPr lang="en-US" sz="1100" dirty="0">
+                <a:solidFill>
+                  <a:schemeClr val="accent5"/>
+                </a:solidFill>
+              </a:endParaRPr>
+            </a:p>
+          </p:txBody>
+        </p:sp>
+        <p:sp>
+          <p:nvSpPr>
+            <p:cNvPr id="38" name="Rectangle 37">
+              <a:extLst>
+                <a:ext uri="{FF2B5EF4-FFF2-40B4-BE49-F238E27FC236}">
+                  <a16:creationId xmlns:a16="http://schemas.microsoft.com/office/drawing/2014/main" id="{920F741D-9525-48B0-B204-BA704B7160C7}"/>
+                </a:ext>
+              </a:extLst>
+            </p:cNvPr>
+            <p:cNvSpPr/>
+            <p:nvPr/>
+          </p:nvSpPr>
+          <p:spPr>
+            <a:xfrm rot="5400000">
+              <a:off x="9543809" y="2792567"/>
+              <a:ext cx="1728000" cy="239994"/>
+            </a:xfrm>
+            <a:prstGeom prst="rect">
+              <a:avLst/>
+            </a:prstGeom>
+            <a:solidFill>
+              <a:schemeClr val="accent1">
+                <a:lumMod val="20000"/>
+                <a:lumOff val="80000"/>
+                <a:alpha val="60000"/>
+              </a:schemeClr>
+            </a:solidFill>
+            <a:ln>
+              <a:noFill/>
+            </a:ln>
+          </p:spPr>
+          <p:style>
+            <a:lnRef idx="2">
+              <a:schemeClr val="accent1">
+                <a:shade val="50000"/>
+              </a:schemeClr>
+            </a:lnRef>
+            <a:fillRef idx="1">
+              <a:schemeClr val="accent1"/>
+            </a:fillRef>
+            <a:effectRef idx="0">
+              <a:schemeClr val="accent1"/>
+            </a:effectRef>
+            <a:fontRef idx="minor">
+              <a:schemeClr val="lt1"/>
+            </a:fontRef>
+          </p:style>
+          <p:txBody>
+            <a:bodyPr rtlCol="0" anchor="ctr"/>
+            <a:lstStyle/>
+            <a:p>
+              <a:endParaRPr lang="en-US" sz="1100" dirty="0">
+                <a:solidFill>
+                  <a:schemeClr val="accent5"/>
+                </a:solidFill>
+              </a:endParaRPr>
+            </a:p>
+          </p:txBody>
+        </p:sp>
+        <p:sp>
+          <p:nvSpPr>
+            <p:cNvPr id="39" name="Rectangle 38">
+              <a:extLst>
+                <a:ext uri="{FF2B5EF4-FFF2-40B4-BE49-F238E27FC236}">
+                  <a16:creationId xmlns:a16="http://schemas.microsoft.com/office/drawing/2014/main" id="{7C242970-5D9F-4D4D-B354-6837CA5841AC}"/>
+                </a:ext>
+              </a:extLst>
+            </p:cNvPr>
+            <p:cNvSpPr/>
+            <p:nvPr/>
+          </p:nvSpPr>
+          <p:spPr>
+            <a:xfrm rot="5400000">
+              <a:off x="7966863" y="2792567"/>
+              <a:ext cx="1728000" cy="239994"/>
+            </a:xfrm>
+            <a:prstGeom prst="rect">
+              <a:avLst/>
+            </a:prstGeom>
+            <a:solidFill>
+              <a:schemeClr val="accent1">
+                <a:lumMod val="20000"/>
+                <a:lumOff val="80000"/>
+                <a:alpha val="60000"/>
+              </a:schemeClr>
+            </a:solidFill>
+            <a:ln>
+              <a:noFill/>
+            </a:ln>
+          </p:spPr>
+          <p:style>
+            <a:lnRef idx="2">
+              <a:schemeClr val="accent1">
+                <a:shade val="50000"/>
+              </a:schemeClr>
+            </a:lnRef>
+            <a:fillRef idx="1">
+              <a:schemeClr val="accent1"/>
+            </a:fillRef>
+            <a:effectRef idx="0">
+              <a:schemeClr val="accent1"/>
+            </a:effectRef>
+            <a:fontRef idx="minor">
+              <a:schemeClr val="lt1"/>
+            </a:fontRef>
+          </p:style>
+          <p:txBody>
+            <a:bodyPr rtlCol="0" anchor="ctr"/>
+            <a:lstStyle/>
+            <a:p>
+              <a:endParaRPr lang="en-US" sz="1100" dirty="0">
+                <a:solidFill>
+                  <a:schemeClr val="accent5"/>
+                </a:solidFill>
+              </a:endParaRPr>
+            </a:p>
+          </p:txBody>
+        </p:sp>
+      </p:grpSp>
+      <p:grpSp>
+        <p:nvGrpSpPr>
+          <p:cNvPr id="48" name="Group 47">
+            <a:extLst>
+              <a:ext uri="{FF2B5EF4-FFF2-40B4-BE49-F238E27FC236}">
+                <a16:creationId xmlns:a16="http://schemas.microsoft.com/office/drawing/2014/main" id="{5C1898F4-6F67-4ADF-B0F0-7C58323FA4BB}"/>
+              </a:ext>
+            </a:extLst>
+          </p:cNvPr>
+          <p:cNvGrpSpPr/>
+          <p:nvPr/>
+        </p:nvGrpSpPr>
+        <p:grpSpPr>
+          <a:xfrm>
+            <a:off x="7726422" y="1682023"/>
+            <a:ext cx="2767076" cy="1224000"/>
+            <a:chOff x="7192214" y="4590000"/>
+            <a:chExt cx="2767076" cy="1224000"/>
+          </a:xfrm>
+        </p:grpSpPr>
+        <p:pic>
+          <p:nvPicPr>
+            <p:cNvPr id="42" name="Graphic 41">
+              <a:extLst>
+                <a:ext uri="{FF2B5EF4-FFF2-40B4-BE49-F238E27FC236}">
+                  <a16:creationId xmlns:a16="http://schemas.microsoft.com/office/drawing/2014/main" id="{60504FBA-2F9E-45F0-B6AA-D82CE98EE3F6}"/>
+                </a:ext>
+              </a:extLst>
+            </p:cNvPr>
+            <p:cNvPicPr>
+              <a:picLocks noChangeAspect="1"/>
+            </p:cNvPicPr>
+            <p:nvPr/>
+          </p:nvPicPr>
+          <p:blipFill>
+            <a:blip r:embed="rId6" cstate="print">
+              <a:extLst>
+                <a:ext uri="{28A0092B-C50C-407E-A947-70E740481C1C}">
+                  <a14:useLocalDpi xmlns:a14="http://schemas.microsoft.com/office/drawing/2010/main" val="0"/>
+                </a:ext>
+                <a:ext uri="{96DAC541-7B7A-43D3-8B79-37D633B846F1}">
+                  <asvg:svgBlip xmlns:asvg="http://schemas.microsoft.com/office/drawing/2016/SVG/main" r:embed="rId7"/>
+                </a:ext>
+              </a:extLst>
+            </a:blip>
+            <a:stretch>
+              <a:fillRect/>
+            </a:stretch>
+          </p:blipFill>
+          <p:spPr>
+            <a:xfrm>
+              <a:off x="7439093" y="4836270"/>
+              <a:ext cx="2268000" cy="708750"/>
+            </a:xfrm>
+            <a:prstGeom prst="rect">
+              <a:avLst/>
+            </a:prstGeom>
+          </p:spPr>
+        </p:pic>
+        <p:sp>
+          <p:nvSpPr>
+            <p:cNvPr id="44" name="Rectangle 43">
+              <a:extLst>
+                <a:ext uri="{FF2B5EF4-FFF2-40B4-BE49-F238E27FC236}">
+                  <a16:creationId xmlns:a16="http://schemas.microsoft.com/office/drawing/2014/main" id="{06BDFC06-7419-448B-8985-79529E7AD0E2}"/>
+                </a:ext>
+              </a:extLst>
+            </p:cNvPr>
+            <p:cNvSpPr/>
+            <p:nvPr/>
+          </p:nvSpPr>
+          <p:spPr>
+            <a:xfrm>
+              <a:off x="7192214" y="4590000"/>
+              <a:ext cx="2767076" cy="239994"/>
+            </a:xfrm>
+            <a:prstGeom prst="rect">
+              <a:avLst/>
+            </a:prstGeom>
+            <a:solidFill>
+              <a:schemeClr val="accent1">
+                <a:lumMod val="20000"/>
+                <a:lumOff val="80000"/>
+                <a:alpha val="60000"/>
+              </a:schemeClr>
+            </a:solidFill>
+            <a:ln>
+              <a:noFill/>
+            </a:ln>
+          </p:spPr>
+          <p:style>
+            <a:lnRef idx="2">
+              <a:schemeClr val="accent1">
+                <a:shade val="50000"/>
+              </a:schemeClr>
+            </a:lnRef>
+            <a:fillRef idx="1">
+              <a:schemeClr val="accent1"/>
+            </a:fillRef>
+            <a:effectRef idx="0">
+              <a:schemeClr val="accent1"/>
+            </a:effectRef>
+            <a:fontRef idx="minor">
+              <a:schemeClr val="lt1"/>
+            </a:fontRef>
+          </p:style>
+          <p:txBody>
+            <a:bodyPr rtlCol="0" anchor="ctr"/>
+            <a:lstStyle/>
+            <a:p>
+              <a:r>
+                <a:rPr lang="en-US" sz="1100" dirty="0">
+                  <a:solidFill>
+                    <a:schemeClr val="accent5"/>
+                  </a:solidFill>
+                </a:rPr>
+                <a:t>x</a:t>
+              </a:r>
+            </a:p>
+          </p:txBody>
+        </p:sp>
+        <p:sp>
+          <p:nvSpPr>
+            <p:cNvPr id="45" name="Rectangle 44">
+              <a:extLst>
+                <a:ext uri="{FF2B5EF4-FFF2-40B4-BE49-F238E27FC236}">
+                  <a16:creationId xmlns:a16="http://schemas.microsoft.com/office/drawing/2014/main" id="{6A50424D-8069-4784-86D2-D989AB41639D}"/>
+                </a:ext>
+              </a:extLst>
+            </p:cNvPr>
+            <p:cNvSpPr/>
+            <p:nvPr/>
+          </p:nvSpPr>
+          <p:spPr>
+            <a:xfrm>
+              <a:off x="7192214" y="5574006"/>
+              <a:ext cx="2767076" cy="239994"/>
+            </a:xfrm>
+            <a:prstGeom prst="rect">
+              <a:avLst/>
+            </a:prstGeom>
+            <a:solidFill>
+              <a:schemeClr val="accent1">
+                <a:lumMod val="20000"/>
+                <a:lumOff val="80000"/>
+                <a:alpha val="60000"/>
+              </a:schemeClr>
+            </a:solidFill>
+            <a:ln>
+              <a:noFill/>
+            </a:ln>
+          </p:spPr>
+          <p:style>
+            <a:lnRef idx="2">
+              <a:schemeClr val="accent1">
+                <a:shade val="50000"/>
+              </a:schemeClr>
+            </a:lnRef>
+            <a:fillRef idx="1">
+              <a:schemeClr val="accent1"/>
+            </a:fillRef>
+            <a:effectRef idx="0">
+              <a:schemeClr val="accent1"/>
+            </a:effectRef>
+            <a:fontRef idx="minor">
+              <a:schemeClr val="lt1"/>
+            </a:fontRef>
+          </p:style>
+          <p:txBody>
+            <a:bodyPr rtlCol="0" anchor="ctr"/>
+            <a:lstStyle/>
+            <a:p>
+              <a:endParaRPr lang="en-US" sz="1100" dirty="0">
+                <a:solidFill>
+                  <a:schemeClr val="accent5"/>
+                </a:solidFill>
+              </a:endParaRPr>
+            </a:p>
+          </p:txBody>
+        </p:sp>
+        <p:sp>
+          <p:nvSpPr>
+            <p:cNvPr id="46" name="Rectangle 45">
+              <a:extLst>
+                <a:ext uri="{FF2B5EF4-FFF2-40B4-BE49-F238E27FC236}">
+                  <a16:creationId xmlns:a16="http://schemas.microsoft.com/office/drawing/2014/main" id="{A5B83162-871B-4EBB-92AF-963844721421}"/>
+                </a:ext>
+              </a:extLst>
+            </p:cNvPr>
+            <p:cNvSpPr/>
+            <p:nvPr/>
+          </p:nvSpPr>
+          <p:spPr>
+            <a:xfrm rot="5400000">
+              <a:off x="9227293" y="5082003"/>
+              <a:ext cx="1224000" cy="239994"/>
+            </a:xfrm>
+            <a:prstGeom prst="rect">
+              <a:avLst/>
+            </a:prstGeom>
+            <a:solidFill>
+              <a:schemeClr val="accent1">
+                <a:lumMod val="20000"/>
+                <a:lumOff val="80000"/>
+                <a:alpha val="60000"/>
+              </a:schemeClr>
+            </a:solidFill>
+            <a:ln>
+              <a:noFill/>
+            </a:ln>
+          </p:spPr>
+          <p:style>
+            <a:lnRef idx="2">
+              <a:schemeClr val="accent1">
+                <a:shade val="50000"/>
+              </a:schemeClr>
+            </a:lnRef>
+            <a:fillRef idx="1">
+              <a:schemeClr val="accent1"/>
+            </a:fillRef>
+            <a:effectRef idx="0">
+              <a:schemeClr val="accent1"/>
+            </a:effectRef>
+            <a:fontRef idx="minor">
+              <a:schemeClr val="lt1"/>
+            </a:fontRef>
+          </p:style>
+          <p:txBody>
+            <a:bodyPr rtlCol="0" anchor="ctr"/>
+            <a:lstStyle/>
+            <a:p>
+              <a:endParaRPr lang="en-US" sz="1100" dirty="0">
+                <a:solidFill>
+                  <a:schemeClr val="accent5"/>
+                </a:solidFill>
+              </a:endParaRPr>
+            </a:p>
+          </p:txBody>
+        </p:sp>
+        <p:sp>
+          <p:nvSpPr>
+            <p:cNvPr id="47" name="Rectangle 46">
+              <a:extLst>
+                <a:ext uri="{FF2B5EF4-FFF2-40B4-BE49-F238E27FC236}">
+                  <a16:creationId xmlns:a16="http://schemas.microsoft.com/office/drawing/2014/main" id="{D2B43D2E-0F44-4AB5-AC70-DEB7E776F1C6}"/>
+                </a:ext>
+              </a:extLst>
+            </p:cNvPr>
+            <p:cNvSpPr/>
+            <p:nvPr/>
+          </p:nvSpPr>
+          <p:spPr>
+            <a:xfrm rot="5400000">
+              <a:off x="6700211" y="5082003"/>
+              <a:ext cx="1224000" cy="239994"/>
+            </a:xfrm>
+            <a:prstGeom prst="rect">
+              <a:avLst/>
+            </a:prstGeom>
+            <a:solidFill>
+              <a:schemeClr val="accent1">
+                <a:lumMod val="20000"/>
+                <a:lumOff val="80000"/>
+                <a:alpha val="60000"/>
+              </a:schemeClr>
+            </a:solidFill>
+            <a:ln>
+              <a:noFill/>
+            </a:ln>
+          </p:spPr>
+          <p:style>
+            <a:lnRef idx="2">
+              <a:schemeClr val="accent1">
+                <a:shade val="50000"/>
+              </a:schemeClr>
+            </a:lnRef>
+            <a:fillRef idx="1">
+              <a:schemeClr val="accent1"/>
+            </a:fillRef>
+            <a:effectRef idx="0">
+              <a:schemeClr val="accent1"/>
+            </a:effectRef>
+            <a:fontRef idx="minor">
+              <a:schemeClr val="lt1"/>
+            </a:fontRef>
+          </p:style>
+          <p:txBody>
+            <a:bodyPr rtlCol="0" anchor="ctr"/>
+            <a:lstStyle/>
+            <a:p>
+              <a:endParaRPr lang="en-US" sz="1100" dirty="0">
+                <a:solidFill>
+                  <a:schemeClr val="accent5"/>
+                </a:solidFill>
+              </a:endParaRPr>
+            </a:p>
+          </p:txBody>
+        </p:sp>
+      </p:grpSp>
     </p:spTree>
     <p:extLst>
       <p:ext uri="{BB962C8B-B14F-4D97-AF65-F5344CB8AC3E}">

</xml_diff>